<commit_message>
Monday, Four days to go
</commit_message>
<xml_diff>
--- a/Trainings/Deck.pptx
+++ b/Trainings/Deck.pptx
@@ -6,8 +6,19 @@
   </p:sldMasterIdLst>
   <p:sldIdLst>
     <p:sldId id="256" r:id="rId2"/>
-    <p:sldId id="257" r:id="rId3"/>
-    <p:sldId id="258" r:id="rId4"/>
+    <p:sldId id="273" r:id="rId3"/>
+    <p:sldId id="257" r:id="rId4"/>
+    <p:sldId id="258" r:id="rId5"/>
+    <p:sldId id="272" r:id="rId6"/>
+    <p:sldId id="259" r:id="rId7"/>
+    <p:sldId id="260" r:id="rId8"/>
+    <p:sldId id="261" r:id="rId9"/>
+    <p:sldId id="262" r:id="rId10"/>
+    <p:sldId id="263" r:id="rId11"/>
+    <p:sldId id="264" r:id="rId12"/>
+    <p:sldId id="265" r:id="rId13"/>
+    <p:sldId id="270" r:id="rId14"/>
+    <p:sldId id="271" r:id="rId15"/>
   </p:sldIdLst>
   <p:sldSz cx="12192000" cy="6858000"/>
   <p:notesSz cx="6858000" cy="9144000"/>
@@ -106,6 +117,11 @@
       </a:defRPr>
     </a:lvl9pPr>
   </p:defaultTextStyle>
+  <p:extLst>
+    <p:ext uri="{EFAFB233-063F-42B5-8137-9DF3F51BA10A}">
+      <p15:sldGuideLst xmlns:p15="http://schemas.microsoft.com/office/powerpoint/2012/main"/>
+    </p:ext>
+  </p:extLst>
 </p:presentation>
 </file>
 
@@ -445,7 +461,7 @@
             <a:fld id="{5923F103-BC34-4FE4-A40E-EDDEECFDA5D0}" type="datetimeFigureOut">
               <a:rPr lang="en-US" dirty="0"/>
               <a:pPr/>
-              <a:t>5/19/2019</a:t>
+              <a:t>5/20/2019</a:t>
             </a:fld>
             <a:endParaRPr lang="en-US" dirty="0"/>
           </a:p>
@@ -1533,7 +1549,7 @@
           <a:p>
             <a:fld id="{923A1CC3-2375-41D4-9E03-427CAF2A4C1A}" type="datetimeFigureOut">
               <a:rPr lang="en-US" dirty="0"/>
-              <a:t>5/19/2019</a:t>
+              <a:t>5/20/2019</a:t>
             </a:fld>
             <a:endParaRPr lang="en-US" dirty="0"/>
           </a:p>
@@ -2513,7 +2529,7 @@
           <a:p>
             <a:fld id="{AFF16868-8199-4C2C-A5B1-63AEE139F88E}" type="datetimeFigureOut">
               <a:rPr lang="en-US" dirty="0"/>
-              <a:t>5/19/2019</a:t>
+              <a:t>5/20/2019</a:t>
             </a:fld>
             <a:endParaRPr lang="en-US" dirty="0"/>
           </a:p>
@@ -3647,7 +3663,7 @@
           <a:p>
             <a:fld id="{AAD9FF7F-6988-44CC-821B-644E70CD2F73}" type="datetimeFigureOut">
               <a:rPr lang="en-US" dirty="0"/>
-              <a:t>5/19/2019</a:t>
+              <a:t>5/20/2019</a:t>
             </a:fld>
             <a:endParaRPr lang="en-US" dirty="0"/>
           </a:p>
@@ -4680,7 +4696,7 @@
           <a:p>
             <a:fld id="{5C12C299-16B2-4475-990D-751901EACC14}" type="datetimeFigureOut">
               <a:rPr lang="en-US" dirty="0"/>
-              <a:t>5/19/2019</a:t>
+              <a:t>5/20/2019</a:t>
             </a:fld>
             <a:endParaRPr lang="en-US" dirty="0"/>
           </a:p>
@@ -5340,7 +5356,7 @@
           <a:p>
             <a:fld id="{9FE86839-B9D8-4651-8783-F325ECE74E65}" type="datetimeFigureOut">
               <a:rPr lang="en-US" dirty="0"/>
-              <a:t>5/19/2019</a:t>
+              <a:t>5/20/2019</a:t>
             </a:fld>
             <a:endParaRPr lang="en-US" dirty="0"/>
           </a:p>
@@ -6201,7 +6217,7 @@
           <a:p>
             <a:fld id="{FD484F64-32F6-45C5-931F-ADC1662401D0}" type="datetimeFigureOut">
               <a:rPr lang="en-US" dirty="0"/>
-              <a:t>5/19/2019</a:t>
+              <a:t>5/20/2019</a:t>
             </a:fld>
             <a:endParaRPr lang="en-US" dirty="0"/>
           </a:p>
@@ -6391,7 +6407,7 @@
           <a:p>
             <a:fld id="{53086D93-FCAC-47E0-A2EE-787E62CA814C}" type="datetimeFigureOut">
               <a:rPr lang="en-US" dirty="0"/>
-              <a:t>5/19/2019</a:t>
+              <a:t>5/20/2019</a:t>
             </a:fld>
             <a:endParaRPr lang="en-US" dirty="0"/>
           </a:p>
@@ -7363,7 +7379,7 @@
           <a:p>
             <a:fld id="{CDA879A6-0FD0-4734-A311-86BFCA472E6E}" type="datetimeFigureOut">
               <a:rPr lang="en-US" dirty="0"/>
-              <a:t>5/19/2019</a:t>
+              <a:t>5/20/2019</a:t>
             </a:fld>
             <a:endParaRPr lang="en-US" dirty="0"/>
           </a:p>
@@ -7574,7 +7590,7 @@
           <a:p>
             <a:fld id="{19C9CA7B-DFD4-44B5-8C60-D14B8CD1FB59}" type="datetimeFigureOut">
               <a:rPr lang="en-US" dirty="0"/>
-              <a:t>5/19/2019</a:t>
+              <a:t>5/20/2019</a:t>
             </a:fld>
             <a:endParaRPr lang="en-US" dirty="0"/>
           </a:p>
@@ -8608,7 +8624,7 @@
           <a:p>
             <a:fld id="{F34E6425-0181-43F2-84FC-787E803FD2F8}" type="datetimeFigureOut">
               <a:rPr lang="en-US" dirty="0"/>
-              <a:t>5/19/2019</a:t>
+              <a:t>5/20/2019</a:t>
             </a:fld>
             <a:endParaRPr lang="en-US" dirty="0"/>
           </a:p>
@@ -8880,7 +8896,7 @@
           <a:p>
             <a:fld id="{3BDB8791-F1B0-41E7-B7FD-A781E65C4266}" type="datetimeFigureOut">
               <a:rPr lang="en-US" dirty="0"/>
-              <a:t>5/19/2019</a:t>
+              <a:t>5/20/2019</a:t>
             </a:fld>
             <a:endParaRPr lang="en-US" dirty="0"/>
           </a:p>
@@ -9290,7 +9306,7 @@
           <a:p>
             <a:fld id="{5FDD63B2-E120-4ED8-B27B-C685F510A5FE}" type="datetimeFigureOut">
               <a:rPr lang="en-US" dirty="0"/>
-              <a:t>5/19/2019</a:t>
+              <a:t>5/20/2019</a:t>
             </a:fld>
             <a:endParaRPr lang="en-US" dirty="0"/>
           </a:p>
@@ -9417,7 +9433,7 @@
           <a:p>
             <a:fld id="{7AA18ACC-A947-437B-A130-35BD54FDF1E9}" type="datetimeFigureOut">
               <a:rPr lang="en-US" dirty="0"/>
-              <a:t>5/19/2019</a:t>
+              <a:t>5/20/2019</a:t>
             </a:fld>
             <a:endParaRPr lang="en-US" dirty="0"/>
           </a:p>
@@ -9512,7 +9528,7 @@
           <a:p>
             <a:fld id="{7C8D7E02-BCB8-4D50-A234-369438C08659}" type="datetimeFigureOut">
               <a:rPr lang="en-US" dirty="0"/>
-              <a:t>5/19/2019</a:t>
+              <a:t>5/20/2019</a:t>
             </a:fld>
             <a:endParaRPr lang="en-US" dirty="0"/>
           </a:p>
@@ -10593,7 +10609,7 @@
           <a:p>
             <a:fld id="{76E86A4C-8E40-4F87-A4F0-01A0687C5742}" type="datetimeFigureOut">
               <a:rPr lang="en-US" dirty="0"/>
-              <a:t>5/19/2019</a:t>
+              <a:t>5/20/2019</a:t>
             </a:fld>
             <a:endParaRPr lang="en-US" dirty="0"/>
           </a:p>
@@ -11701,7 +11717,7 @@
           <a:p>
             <a:fld id="{35E72C73-2D91-4E12-BA25-F0AA0C03599B}" type="datetimeFigureOut">
               <a:rPr lang="en-US" dirty="0"/>
-              <a:t>5/19/2019</a:t>
+              <a:t>5/20/2019</a:t>
             </a:fld>
             <a:endParaRPr lang="en-US" dirty="0"/>
           </a:p>
@@ -12698,7 +12714,7 @@
           <a:p>
             <a:fld id="{2BE451C3-0FF4-47C4-B829-773ADF60F88C}" type="datetimeFigureOut">
               <a:rPr lang="en-US" dirty="0"/>
-              <a:t>5/19/2019</a:t>
+              <a:t>5/20/2019</a:t>
             </a:fld>
             <a:endParaRPr lang="en-US" dirty="0"/>
           </a:p>
@@ -13444,7 +13460,1449 @@
 </p:sld>
 </file>
 
+<file path=ppt/slides/slide10.xml><?xml version="1.0" encoding="utf-8"?>
+<p:sld xmlns:a="http://schemas.openxmlformats.org/drawingml/2006/main" xmlns:r="http://schemas.openxmlformats.org/officeDocument/2006/relationships" xmlns:p="http://schemas.openxmlformats.org/presentationml/2006/main">
+  <p:cSld>
+    <p:spTree>
+      <p:nvGrpSpPr>
+        <p:cNvPr id="1" name=""/>
+        <p:cNvGrpSpPr/>
+        <p:nvPr/>
+      </p:nvGrpSpPr>
+      <p:grpSpPr>
+        <a:xfrm>
+          <a:off x="0" y="0"/>
+          <a:ext cx="0" cy="0"/>
+          <a:chOff x="0" y="0"/>
+          <a:chExt cx="0" cy="0"/>
+        </a:xfrm>
+      </p:grpSpPr>
+      <p:sp>
+        <p:nvSpPr>
+          <p:cNvPr id="2" name="Title 1"/>
+          <p:cNvSpPr>
+            <a:spLocks noGrp="1"/>
+          </p:cNvSpPr>
+          <p:nvPr>
+            <p:ph type="title"/>
+          </p:nvPr>
+        </p:nvSpPr>
+        <p:spPr>
+          <a:xfrm>
+            <a:off x="1154954" y="973668"/>
+            <a:ext cx="8761413" cy="559568"/>
+          </a:xfrm>
+        </p:spPr>
+        <p:txBody>
+          <a:bodyPr/>
+          <a:lstStyle/>
+          <a:p>
+            <a:r>
+              <a:rPr lang="en-US" dirty="0" smtClean="0"/>
+              <a:t>05</a:t>
+            </a:r>
+            <a:endParaRPr lang="en-US" dirty="0"/>
+          </a:p>
+        </p:txBody>
+      </p:sp>
+      <p:pic>
+        <p:nvPicPr>
+          <p:cNvPr id="4" name="Picture 3"/>
+          <p:cNvPicPr>
+            <a:picLocks noChangeAspect="1"/>
+          </p:cNvPicPr>
+          <p:nvPr/>
+        </p:nvPicPr>
+        <p:blipFill>
+          <a:blip r:embed="rId2">
+            <a:extLst>
+              <a:ext uri="{28A0092B-C50C-407E-A947-70E740481C1C}">
+                <a14:useLocalDpi xmlns:a14="http://schemas.microsoft.com/office/drawing/2010/main" val="0"/>
+              </a:ext>
+            </a:extLst>
+          </a:blip>
+          <a:stretch>
+            <a:fillRect/>
+          </a:stretch>
+        </p:blipFill>
+        <p:spPr>
+          <a:xfrm>
+            <a:off x="11093450" y="5749925"/>
+            <a:ext cx="1098550" cy="1098550"/>
+          </a:xfrm>
+          <a:prstGeom prst="rect">
+            <a:avLst/>
+          </a:prstGeom>
+        </p:spPr>
+      </p:pic>
+      <p:sp>
+        <p:nvSpPr>
+          <p:cNvPr id="5" name="Content Placeholder 8"/>
+          <p:cNvSpPr txBox="1">
+            <a:spLocks/>
+          </p:cNvSpPr>
+          <p:nvPr/>
+        </p:nvSpPr>
+        <p:spPr>
+          <a:xfrm>
+            <a:off x="979463" y="2364508"/>
+            <a:ext cx="8825659" cy="384175"/>
+          </a:xfrm>
+          <a:prstGeom prst="rect">
+            <a:avLst/>
+          </a:prstGeom>
+        </p:spPr>
+        <p:txBody>
+          <a:bodyPr vert="horz" lIns="91440" tIns="45720" rIns="91440" bIns="45720" rtlCol="0">
+            <a:normAutofit fontScale="92500" lnSpcReduction="20000"/>
+          </a:bodyPr>
+          <a:lstStyle>
+            <a:lvl1pPr marL="342900" indent="-342900" algn="l" defTabSz="457200" rtl="0" eaLnBrk="1" latinLnBrk="0" hangingPunct="1">
+              <a:spcBef>
+                <a:spcPts val="1000"/>
+              </a:spcBef>
+              <a:spcAft>
+                <a:spcPts val="0"/>
+              </a:spcAft>
+              <a:buClr>
+                <a:schemeClr val="accent1"/>
+              </a:buClr>
+              <a:buSzPct val="80000"/>
+              <a:buFont typeface="Wingdings 3" charset="2"/>
+              <a:buChar char=""/>
+              <a:defRPr sz="1800" b="0" i="0" kern="1200">
+                <a:solidFill>
+                  <a:schemeClr val="tx1">
+                    <a:lumMod val="75000"/>
+                    <a:lumOff val="25000"/>
+                  </a:schemeClr>
+                </a:solidFill>
+                <a:latin typeface="+mn-lt"/>
+                <a:ea typeface="+mn-ea"/>
+                <a:cs typeface="+mn-cs"/>
+              </a:defRPr>
+            </a:lvl1pPr>
+            <a:lvl2pPr marL="742950" indent="-285750" algn="l" defTabSz="457200" rtl="0" eaLnBrk="1" latinLnBrk="0" hangingPunct="1">
+              <a:spcBef>
+                <a:spcPts val="1000"/>
+              </a:spcBef>
+              <a:spcAft>
+                <a:spcPts val="0"/>
+              </a:spcAft>
+              <a:buClr>
+                <a:schemeClr val="accent1"/>
+              </a:buClr>
+              <a:buSzPct val="80000"/>
+              <a:buFont typeface="Wingdings 3" charset="2"/>
+              <a:buChar char=""/>
+              <a:defRPr sz="1600" b="0" i="0" kern="1200">
+                <a:solidFill>
+                  <a:schemeClr val="tx1">
+                    <a:lumMod val="75000"/>
+                    <a:lumOff val="25000"/>
+                  </a:schemeClr>
+                </a:solidFill>
+                <a:latin typeface="+mn-lt"/>
+                <a:ea typeface="+mn-ea"/>
+                <a:cs typeface="+mn-cs"/>
+              </a:defRPr>
+            </a:lvl2pPr>
+            <a:lvl3pPr marL="1143000" indent="-228600" algn="l" defTabSz="457200" rtl="0" eaLnBrk="1" latinLnBrk="0" hangingPunct="1">
+              <a:spcBef>
+                <a:spcPts val="1000"/>
+              </a:spcBef>
+              <a:spcAft>
+                <a:spcPts val="0"/>
+              </a:spcAft>
+              <a:buClr>
+                <a:schemeClr val="accent1"/>
+              </a:buClr>
+              <a:buSzPct val="80000"/>
+              <a:buFont typeface="Wingdings 3" charset="2"/>
+              <a:buChar char=""/>
+              <a:defRPr sz="1400" b="0" i="0" kern="1200">
+                <a:solidFill>
+                  <a:schemeClr val="tx1">
+                    <a:lumMod val="75000"/>
+                    <a:lumOff val="25000"/>
+                  </a:schemeClr>
+                </a:solidFill>
+                <a:latin typeface="+mn-lt"/>
+                <a:ea typeface="+mn-ea"/>
+                <a:cs typeface="+mn-cs"/>
+              </a:defRPr>
+            </a:lvl3pPr>
+            <a:lvl4pPr marL="1600200" indent="-228600" algn="l" defTabSz="457200" rtl="0" eaLnBrk="1" latinLnBrk="0" hangingPunct="1">
+              <a:spcBef>
+                <a:spcPts val="1000"/>
+              </a:spcBef>
+              <a:spcAft>
+                <a:spcPts val="0"/>
+              </a:spcAft>
+              <a:buClr>
+                <a:schemeClr val="accent1"/>
+              </a:buClr>
+              <a:buSzPct val="80000"/>
+              <a:buFont typeface="Wingdings 3" charset="2"/>
+              <a:buChar char=""/>
+              <a:defRPr sz="1200" b="0" i="0" kern="1200">
+                <a:solidFill>
+                  <a:schemeClr val="tx1">
+                    <a:lumMod val="75000"/>
+                    <a:lumOff val="25000"/>
+                  </a:schemeClr>
+                </a:solidFill>
+                <a:latin typeface="+mn-lt"/>
+                <a:ea typeface="+mn-ea"/>
+                <a:cs typeface="+mn-cs"/>
+              </a:defRPr>
+            </a:lvl4pPr>
+            <a:lvl5pPr marL="2057400" indent="-228600" algn="l" defTabSz="457200" rtl="0" eaLnBrk="1" latinLnBrk="0" hangingPunct="1">
+              <a:spcBef>
+                <a:spcPts val="1000"/>
+              </a:spcBef>
+              <a:spcAft>
+                <a:spcPts val="0"/>
+              </a:spcAft>
+              <a:buClr>
+                <a:schemeClr val="accent1"/>
+              </a:buClr>
+              <a:buSzPct val="80000"/>
+              <a:buFont typeface="Wingdings 3" charset="2"/>
+              <a:buChar char=""/>
+              <a:defRPr sz="1200" b="0" i="0" kern="1200">
+                <a:solidFill>
+                  <a:schemeClr val="tx1">
+                    <a:lumMod val="75000"/>
+                    <a:lumOff val="25000"/>
+                  </a:schemeClr>
+                </a:solidFill>
+                <a:latin typeface="+mn-lt"/>
+                <a:ea typeface="+mn-ea"/>
+                <a:cs typeface="+mn-cs"/>
+              </a:defRPr>
+            </a:lvl5pPr>
+            <a:lvl6pPr marL="2514600" indent="-228600" algn="l" defTabSz="457200" rtl="0" eaLnBrk="1" latinLnBrk="0" hangingPunct="1">
+              <a:spcBef>
+                <a:spcPts val="1000"/>
+              </a:spcBef>
+              <a:spcAft>
+                <a:spcPts val="0"/>
+              </a:spcAft>
+              <a:buClr>
+                <a:schemeClr val="accent1"/>
+              </a:buClr>
+              <a:buSzPct val="80000"/>
+              <a:buFont typeface="Wingdings 3" charset="2"/>
+              <a:buChar char=""/>
+              <a:defRPr sz="1200" b="0" i="0" kern="1200">
+                <a:solidFill>
+                  <a:schemeClr val="tx1">
+                    <a:lumMod val="75000"/>
+                    <a:lumOff val="25000"/>
+                  </a:schemeClr>
+                </a:solidFill>
+                <a:latin typeface="+mn-lt"/>
+                <a:ea typeface="+mn-ea"/>
+                <a:cs typeface="+mn-cs"/>
+              </a:defRPr>
+            </a:lvl6pPr>
+            <a:lvl7pPr marL="2971800" indent="-228600" algn="l" defTabSz="457200" rtl="0" eaLnBrk="1" latinLnBrk="0" hangingPunct="1">
+              <a:spcBef>
+                <a:spcPts val="1000"/>
+              </a:spcBef>
+              <a:spcAft>
+                <a:spcPts val="0"/>
+              </a:spcAft>
+              <a:buClr>
+                <a:schemeClr val="accent1"/>
+              </a:buClr>
+              <a:buSzPct val="80000"/>
+              <a:buFont typeface="Wingdings 3" charset="2"/>
+              <a:buChar char=""/>
+              <a:defRPr sz="1200" b="0" i="0" kern="1200">
+                <a:solidFill>
+                  <a:schemeClr val="tx1">
+                    <a:lumMod val="75000"/>
+                    <a:lumOff val="25000"/>
+                  </a:schemeClr>
+                </a:solidFill>
+                <a:latin typeface="+mn-lt"/>
+                <a:ea typeface="+mn-ea"/>
+                <a:cs typeface="+mn-cs"/>
+              </a:defRPr>
+            </a:lvl7pPr>
+            <a:lvl8pPr marL="3429000" indent="-228600" algn="l" defTabSz="457200" rtl="0" eaLnBrk="1" latinLnBrk="0" hangingPunct="1">
+              <a:spcBef>
+                <a:spcPts val="1000"/>
+              </a:spcBef>
+              <a:spcAft>
+                <a:spcPts val="0"/>
+              </a:spcAft>
+              <a:buClr>
+                <a:schemeClr val="accent1"/>
+              </a:buClr>
+              <a:buSzPct val="80000"/>
+              <a:buFont typeface="Wingdings 3" charset="2"/>
+              <a:buChar char=""/>
+              <a:defRPr sz="1200" b="0" i="0" kern="1200">
+                <a:solidFill>
+                  <a:schemeClr val="tx1">
+                    <a:lumMod val="75000"/>
+                    <a:lumOff val="25000"/>
+                  </a:schemeClr>
+                </a:solidFill>
+                <a:latin typeface="+mn-lt"/>
+                <a:ea typeface="+mn-ea"/>
+                <a:cs typeface="+mn-cs"/>
+              </a:defRPr>
+            </a:lvl8pPr>
+            <a:lvl9pPr marL="3886200" indent="-228600" algn="l" defTabSz="457200" rtl="0" eaLnBrk="1" latinLnBrk="0" hangingPunct="1">
+              <a:spcBef>
+                <a:spcPts val="1000"/>
+              </a:spcBef>
+              <a:spcAft>
+                <a:spcPts val="0"/>
+              </a:spcAft>
+              <a:buClr>
+                <a:schemeClr val="accent1"/>
+              </a:buClr>
+              <a:buSzPct val="80000"/>
+              <a:buFont typeface="Wingdings 3" charset="2"/>
+              <a:buChar char=""/>
+              <a:defRPr sz="1200" b="0" i="0" kern="1200">
+                <a:solidFill>
+                  <a:schemeClr val="tx1">
+                    <a:lumMod val="75000"/>
+                    <a:lumOff val="25000"/>
+                  </a:schemeClr>
+                </a:solidFill>
+                <a:latin typeface="+mn-lt"/>
+                <a:ea typeface="+mn-ea"/>
+                <a:cs typeface="+mn-cs"/>
+              </a:defRPr>
+            </a:lvl9pPr>
+          </a:lstStyle>
+          <a:p>
+            <a:pPr marL="0" indent="0" algn="ctr">
+              <a:buFont typeface="Wingdings 3" charset="2"/>
+              <a:buNone/>
+            </a:pPr>
+            <a:r>
+              <a:rPr lang="en-US" sz="2400" b="1" i="1" dirty="0" smtClean="0"/>
+              <a:t>Develop a Website</a:t>
+            </a:r>
+          </a:p>
+        </p:txBody>
+      </p:sp>
+    </p:spTree>
+    <p:extLst>
+      <p:ext uri="{BB962C8B-B14F-4D97-AF65-F5344CB8AC3E}">
+        <p14:creationId xmlns:p14="http://schemas.microsoft.com/office/powerpoint/2010/main" val="289660463"/>
+      </p:ext>
+    </p:extLst>
+  </p:cSld>
+  <p:clrMapOvr>
+    <a:masterClrMapping/>
+  </p:clrMapOvr>
+  <p:timing>
+    <p:tnLst>
+      <p:par>
+        <p:cTn id="1" dur="indefinite" restart="never" nodeType="tmRoot"/>
+      </p:par>
+    </p:tnLst>
+  </p:timing>
+</p:sld>
+</file>
+
+<file path=ppt/slides/slide11.xml><?xml version="1.0" encoding="utf-8"?>
+<p:sld xmlns:a="http://schemas.openxmlformats.org/drawingml/2006/main" xmlns:r="http://schemas.openxmlformats.org/officeDocument/2006/relationships" xmlns:p="http://schemas.openxmlformats.org/presentationml/2006/main">
+  <p:cSld>
+    <p:spTree>
+      <p:nvGrpSpPr>
+        <p:cNvPr id="1" name=""/>
+        <p:cNvGrpSpPr/>
+        <p:nvPr/>
+      </p:nvGrpSpPr>
+      <p:grpSpPr>
+        <a:xfrm>
+          <a:off x="0" y="0"/>
+          <a:ext cx="0" cy="0"/>
+          <a:chOff x="0" y="0"/>
+          <a:chExt cx="0" cy="0"/>
+        </a:xfrm>
+      </p:grpSpPr>
+      <p:sp>
+        <p:nvSpPr>
+          <p:cNvPr id="2" name="Title 1"/>
+          <p:cNvSpPr>
+            <a:spLocks noGrp="1"/>
+          </p:cNvSpPr>
+          <p:nvPr>
+            <p:ph type="title"/>
+          </p:nvPr>
+        </p:nvSpPr>
+        <p:spPr>
+          <a:xfrm>
+            <a:off x="1154954" y="973668"/>
+            <a:ext cx="8761413" cy="559568"/>
+          </a:xfrm>
+        </p:spPr>
+        <p:txBody>
+          <a:bodyPr/>
+          <a:lstStyle/>
+          <a:p>
+            <a:r>
+              <a:rPr lang="en-US" dirty="0" smtClean="0"/>
+              <a:t>06</a:t>
+            </a:r>
+            <a:endParaRPr lang="en-US" dirty="0"/>
+          </a:p>
+        </p:txBody>
+      </p:sp>
+      <p:pic>
+        <p:nvPicPr>
+          <p:cNvPr id="4" name="Picture 3"/>
+          <p:cNvPicPr>
+            <a:picLocks noChangeAspect="1"/>
+          </p:cNvPicPr>
+          <p:nvPr/>
+        </p:nvPicPr>
+        <p:blipFill>
+          <a:blip r:embed="rId2">
+            <a:extLst>
+              <a:ext uri="{28A0092B-C50C-407E-A947-70E740481C1C}">
+                <a14:useLocalDpi xmlns:a14="http://schemas.microsoft.com/office/drawing/2010/main" val="0"/>
+              </a:ext>
+            </a:extLst>
+          </a:blip>
+          <a:stretch>
+            <a:fillRect/>
+          </a:stretch>
+        </p:blipFill>
+        <p:spPr>
+          <a:xfrm>
+            <a:off x="11093450" y="5759450"/>
+            <a:ext cx="1098550" cy="1098550"/>
+          </a:xfrm>
+          <a:prstGeom prst="rect">
+            <a:avLst/>
+          </a:prstGeom>
+        </p:spPr>
+      </p:pic>
+      <p:sp>
+        <p:nvSpPr>
+          <p:cNvPr id="5" name="Content Placeholder 8"/>
+          <p:cNvSpPr txBox="1">
+            <a:spLocks/>
+          </p:cNvSpPr>
+          <p:nvPr/>
+        </p:nvSpPr>
+        <p:spPr>
+          <a:xfrm>
+            <a:off x="979463" y="2364508"/>
+            <a:ext cx="8825659" cy="384175"/>
+          </a:xfrm>
+          <a:prstGeom prst="rect">
+            <a:avLst/>
+          </a:prstGeom>
+        </p:spPr>
+        <p:txBody>
+          <a:bodyPr vert="horz" lIns="91440" tIns="45720" rIns="91440" bIns="45720" rtlCol="0">
+            <a:normAutofit fontScale="92500" lnSpcReduction="20000"/>
+          </a:bodyPr>
+          <a:lstStyle>
+            <a:lvl1pPr marL="342900" indent="-342900" algn="l" defTabSz="457200" rtl="0" eaLnBrk="1" latinLnBrk="0" hangingPunct="1">
+              <a:spcBef>
+                <a:spcPts val="1000"/>
+              </a:spcBef>
+              <a:spcAft>
+                <a:spcPts val="0"/>
+              </a:spcAft>
+              <a:buClr>
+                <a:schemeClr val="accent1"/>
+              </a:buClr>
+              <a:buSzPct val="80000"/>
+              <a:buFont typeface="Wingdings 3" charset="2"/>
+              <a:buChar char=""/>
+              <a:defRPr sz="1800" b="0" i="0" kern="1200">
+                <a:solidFill>
+                  <a:schemeClr val="tx1">
+                    <a:lumMod val="75000"/>
+                    <a:lumOff val="25000"/>
+                  </a:schemeClr>
+                </a:solidFill>
+                <a:latin typeface="+mn-lt"/>
+                <a:ea typeface="+mn-ea"/>
+                <a:cs typeface="+mn-cs"/>
+              </a:defRPr>
+            </a:lvl1pPr>
+            <a:lvl2pPr marL="742950" indent="-285750" algn="l" defTabSz="457200" rtl="0" eaLnBrk="1" latinLnBrk="0" hangingPunct="1">
+              <a:spcBef>
+                <a:spcPts val="1000"/>
+              </a:spcBef>
+              <a:spcAft>
+                <a:spcPts val="0"/>
+              </a:spcAft>
+              <a:buClr>
+                <a:schemeClr val="accent1"/>
+              </a:buClr>
+              <a:buSzPct val="80000"/>
+              <a:buFont typeface="Wingdings 3" charset="2"/>
+              <a:buChar char=""/>
+              <a:defRPr sz="1600" b="0" i="0" kern="1200">
+                <a:solidFill>
+                  <a:schemeClr val="tx1">
+                    <a:lumMod val="75000"/>
+                    <a:lumOff val="25000"/>
+                  </a:schemeClr>
+                </a:solidFill>
+                <a:latin typeface="+mn-lt"/>
+                <a:ea typeface="+mn-ea"/>
+                <a:cs typeface="+mn-cs"/>
+              </a:defRPr>
+            </a:lvl2pPr>
+            <a:lvl3pPr marL="1143000" indent="-228600" algn="l" defTabSz="457200" rtl="0" eaLnBrk="1" latinLnBrk="0" hangingPunct="1">
+              <a:spcBef>
+                <a:spcPts val="1000"/>
+              </a:spcBef>
+              <a:spcAft>
+                <a:spcPts val="0"/>
+              </a:spcAft>
+              <a:buClr>
+                <a:schemeClr val="accent1"/>
+              </a:buClr>
+              <a:buSzPct val="80000"/>
+              <a:buFont typeface="Wingdings 3" charset="2"/>
+              <a:buChar char=""/>
+              <a:defRPr sz="1400" b="0" i="0" kern="1200">
+                <a:solidFill>
+                  <a:schemeClr val="tx1">
+                    <a:lumMod val="75000"/>
+                    <a:lumOff val="25000"/>
+                  </a:schemeClr>
+                </a:solidFill>
+                <a:latin typeface="+mn-lt"/>
+                <a:ea typeface="+mn-ea"/>
+                <a:cs typeface="+mn-cs"/>
+              </a:defRPr>
+            </a:lvl3pPr>
+            <a:lvl4pPr marL="1600200" indent="-228600" algn="l" defTabSz="457200" rtl="0" eaLnBrk="1" latinLnBrk="0" hangingPunct="1">
+              <a:spcBef>
+                <a:spcPts val="1000"/>
+              </a:spcBef>
+              <a:spcAft>
+                <a:spcPts val="0"/>
+              </a:spcAft>
+              <a:buClr>
+                <a:schemeClr val="accent1"/>
+              </a:buClr>
+              <a:buSzPct val="80000"/>
+              <a:buFont typeface="Wingdings 3" charset="2"/>
+              <a:buChar char=""/>
+              <a:defRPr sz="1200" b="0" i="0" kern="1200">
+                <a:solidFill>
+                  <a:schemeClr val="tx1">
+                    <a:lumMod val="75000"/>
+                    <a:lumOff val="25000"/>
+                  </a:schemeClr>
+                </a:solidFill>
+                <a:latin typeface="+mn-lt"/>
+                <a:ea typeface="+mn-ea"/>
+                <a:cs typeface="+mn-cs"/>
+              </a:defRPr>
+            </a:lvl4pPr>
+            <a:lvl5pPr marL="2057400" indent="-228600" algn="l" defTabSz="457200" rtl="0" eaLnBrk="1" latinLnBrk="0" hangingPunct="1">
+              <a:spcBef>
+                <a:spcPts val="1000"/>
+              </a:spcBef>
+              <a:spcAft>
+                <a:spcPts val="0"/>
+              </a:spcAft>
+              <a:buClr>
+                <a:schemeClr val="accent1"/>
+              </a:buClr>
+              <a:buSzPct val="80000"/>
+              <a:buFont typeface="Wingdings 3" charset="2"/>
+              <a:buChar char=""/>
+              <a:defRPr sz="1200" b="0" i="0" kern="1200">
+                <a:solidFill>
+                  <a:schemeClr val="tx1">
+                    <a:lumMod val="75000"/>
+                    <a:lumOff val="25000"/>
+                  </a:schemeClr>
+                </a:solidFill>
+                <a:latin typeface="+mn-lt"/>
+                <a:ea typeface="+mn-ea"/>
+                <a:cs typeface="+mn-cs"/>
+              </a:defRPr>
+            </a:lvl5pPr>
+            <a:lvl6pPr marL="2514600" indent="-228600" algn="l" defTabSz="457200" rtl="0" eaLnBrk="1" latinLnBrk="0" hangingPunct="1">
+              <a:spcBef>
+                <a:spcPts val="1000"/>
+              </a:spcBef>
+              <a:spcAft>
+                <a:spcPts val="0"/>
+              </a:spcAft>
+              <a:buClr>
+                <a:schemeClr val="accent1"/>
+              </a:buClr>
+              <a:buSzPct val="80000"/>
+              <a:buFont typeface="Wingdings 3" charset="2"/>
+              <a:buChar char=""/>
+              <a:defRPr sz="1200" b="0" i="0" kern="1200">
+                <a:solidFill>
+                  <a:schemeClr val="tx1">
+                    <a:lumMod val="75000"/>
+                    <a:lumOff val="25000"/>
+                  </a:schemeClr>
+                </a:solidFill>
+                <a:latin typeface="+mn-lt"/>
+                <a:ea typeface="+mn-ea"/>
+                <a:cs typeface="+mn-cs"/>
+              </a:defRPr>
+            </a:lvl6pPr>
+            <a:lvl7pPr marL="2971800" indent="-228600" algn="l" defTabSz="457200" rtl="0" eaLnBrk="1" latinLnBrk="0" hangingPunct="1">
+              <a:spcBef>
+                <a:spcPts val="1000"/>
+              </a:spcBef>
+              <a:spcAft>
+                <a:spcPts val="0"/>
+              </a:spcAft>
+              <a:buClr>
+                <a:schemeClr val="accent1"/>
+              </a:buClr>
+              <a:buSzPct val="80000"/>
+              <a:buFont typeface="Wingdings 3" charset="2"/>
+              <a:buChar char=""/>
+              <a:defRPr sz="1200" b="0" i="0" kern="1200">
+                <a:solidFill>
+                  <a:schemeClr val="tx1">
+                    <a:lumMod val="75000"/>
+                    <a:lumOff val="25000"/>
+                  </a:schemeClr>
+                </a:solidFill>
+                <a:latin typeface="+mn-lt"/>
+                <a:ea typeface="+mn-ea"/>
+                <a:cs typeface="+mn-cs"/>
+              </a:defRPr>
+            </a:lvl7pPr>
+            <a:lvl8pPr marL="3429000" indent="-228600" algn="l" defTabSz="457200" rtl="0" eaLnBrk="1" latinLnBrk="0" hangingPunct="1">
+              <a:spcBef>
+                <a:spcPts val="1000"/>
+              </a:spcBef>
+              <a:spcAft>
+                <a:spcPts val="0"/>
+              </a:spcAft>
+              <a:buClr>
+                <a:schemeClr val="accent1"/>
+              </a:buClr>
+              <a:buSzPct val="80000"/>
+              <a:buFont typeface="Wingdings 3" charset="2"/>
+              <a:buChar char=""/>
+              <a:defRPr sz="1200" b="0" i="0" kern="1200">
+                <a:solidFill>
+                  <a:schemeClr val="tx1">
+                    <a:lumMod val="75000"/>
+                    <a:lumOff val="25000"/>
+                  </a:schemeClr>
+                </a:solidFill>
+                <a:latin typeface="+mn-lt"/>
+                <a:ea typeface="+mn-ea"/>
+                <a:cs typeface="+mn-cs"/>
+              </a:defRPr>
+            </a:lvl8pPr>
+            <a:lvl9pPr marL="3886200" indent="-228600" algn="l" defTabSz="457200" rtl="0" eaLnBrk="1" latinLnBrk="0" hangingPunct="1">
+              <a:spcBef>
+                <a:spcPts val="1000"/>
+              </a:spcBef>
+              <a:spcAft>
+                <a:spcPts val="0"/>
+              </a:spcAft>
+              <a:buClr>
+                <a:schemeClr val="accent1"/>
+              </a:buClr>
+              <a:buSzPct val="80000"/>
+              <a:buFont typeface="Wingdings 3" charset="2"/>
+              <a:buChar char=""/>
+              <a:defRPr sz="1200" b="0" i="0" kern="1200">
+                <a:solidFill>
+                  <a:schemeClr val="tx1">
+                    <a:lumMod val="75000"/>
+                    <a:lumOff val="25000"/>
+                  </a:schemeClr>
+                </a:solidFill>
+                <a:latin typeface="+mn-lt"/>
+                <a:ea typeface="+mn-ea"/>
+                <a:cs typeface="+mn-cs"/>
+              </a:defRPr>
+            </a:lvl9pPr>
+          </a:lstStyle>
+          <a:p>
+            <a:pPr marL="0" indent="0" algn="ctr">
+              <a:buFont typeface="Wingdings 3" charset="2"/>
+              <a:buNone/>
+            </a:pPr>
+            <a:r>
+              <a:rPr lang="en-US" sz="2400" b="1" i="1" dirty="0" smtClean="0"/>
+              <a:t>Set up R Clubs in campuses</a:t>
+            </a:r>
+          </a:p>
+        </p:txBody>
+      </p:sp>
+    </p:spTree>
+    <p:extLst>
+      <p:ext uri="{BB962C8B-B14F-4D97-AF65-F5344CB8AC3E}">
+        <p14:creationId xmlns:p14="http://schemas.microsoft.com/office/powerpoint/2010/main" val="2017268886"/>
+      </p:ext>
+    </p:extLst>
+  </p:cSld>
+  <p:clrMapOvr>
+    <a:masterClrMapping/>
+  </p:clrMapOvr>
+  <p:timing>
+    <p:tnLst>
+      <p:par>
+        <p:cTn id="1" dur="indefinite" restart="never" nodeType="tmRoot"/>
+      </p:par>
+    </p:tnLst>
+  </p:timing>
+</p:sld>
+</file>
+
+<file path=ppt/slides/slide12.xml><?xml version="1.0" encoding="utf-8"?>
+<p:sld xmlns:a="http://schemas.openxmlformats.org/drawingml/2006/main" xmlns:r="http://schemas.openxmlformats.org/officeDocument/2006/relationships" xmlns:p="http://schemas.openxmlformats.org/presentationml/2006/main">
+  <p:cSld>
+    <p:spTree>
+      <p:nvGrpSpPr>
+        <p:cNvPr id="1" name=""/>
+        <p:cNvGrpSpPr/>
+        <p:nvPr/>
+      </p:nvGrpSpPr>
+      <p:grpSpPr>
+        <a:xfrm>
+          <a:off x="0" y="0"/>
+          <a:ext cx="0" cy="0"/>
+          <a:chOff x="0" y="0"/>
+          <a:chExt cx="0" cy="0"/>
+        </a:xfrm>
+      </p:grpSpPr>
+      <p:sp>
+        <p:nvSpPr>
+          <p:cNvPr id="2" name="Title 1"/>
+          <p:cNvSpPr>
+            <a:spLocks noGrp="1"/>
+          </p:cNvSpPr>
+          <p:nvPr>
+            <p:ph type="title"/>
+          </p:nvPr>
+        </p:nvSpPr>
+        <p:spPr>
+          <a:xfrm>
+            <a:off x="858982" y="868218"/>
+            <a:ext cx="8715640" cy="969818"/>
+          </a:xfrm>
+        </p:spPr>
+        <p:txBody>
+          <a:bodyPr/>
+          <a:lstStyle/>
+          <a:p>
+            <a:r>
+              <a:rPr lang="en-US" dirty="0" smtClean="0"/>
+              <a:t>07: </a:t>
+            </a:r>
+            <a:r>
+              <a:rPr lang="en-US" b="1" i="1" dirty="0" err="1"/>
+              <a:t>AfricaR</a:t>
+            </a:r>
+            <a:r>
+              <a:rPr lang="en-US" b="1" i="1" dirty="0"/>
+              <a:t> Monetary Fund</a:t>
+            </a:r>
+            <a:br>
+              <a:rPr lang="en-US" b="1" i="1" dirty="0"/>
+            </a:br>
+            <a:endParaRPr lang="en-US" dirty="0"/>
+          </a:p>
+        </p:txBody>
+      </p:sp>
+      <p:pic>
+        <p:nvPicPr>
+          <p:cNvPr id="4" name="Picture 3"/>
+          <p:cNvPicPr>
+            <a:picLocks noChangeAspect="1"/>
+          </p:cNvPicPr>
+          <p:nvPr/>
+        </p:nvPicPr>
+        <p:blipFill>
+          <a:blip r:embed="rId2">
+            <a:extLst>
+              <a:ext uri="{28A0092B-C50C-407E-A947-70E740481C1C}">
+                <a14:useLocalDpi xmlns:a14="http://schemas.microsoft.com/office/drawing/2010/main" val="0"/>
+              </a:ext>
+            </a:extLst>
+          </a:blip>
+          <a:stretch>
+            <a:fillRect/>
+          </a:stretch>
+        </p:blipFill>
+        <p:spPr>
+          <a:xfrm>
+            <a:off x="11093450" y="5759450"/>
+            <a:ext cx="1098550" cy="1098550"/>
+          </a:xfrm>
+          <a:prstGeom prst="rect">
+            <a:avLst/>
+          </a:prstGeom>
+        </p:spPr>
+      </p:pic>
+      <p:sp>
+        <p:nvSpPr>
+          <p:cNvPr id="5" name="Content Placeholder 8"/>
+          <p:cNvSpPr txBox="1">
+            <a:spLocks/>
+          </p:cNvSpPr>
+          <p:nvPr/>
+        </p:nvSpPr>
+        <p:spPr>
+          <a:xfrm>
+            <a:off x="979463" y="2364508"/>
+            <a:ext cx="8825659" cy="384175"/>
+          </a:xfrm>
+          <a:prstGeom prst="rect">
+            <a:avLst/>
+          </a:prstGeom>
+        </p:spPr>
+        <p:txBody>
+          <a:bodyPr vert="horz" lIns="91440" tIns="45720" rIns="91440" bIns="45720" rtlCol="0">
+            <a:noAutofit/>
+          </a:bodyPr>
+          <a:lstStyle>
+            <a:lvl1pPr marL="342900" indent="-342900" algn="l" defTabSz="457200" rtl="0" eaLnBrk="1" latinLnBrk="0" hangingPunct="1">
+              <a:spcBef>
+                <a:spcPts val="1000"/>
+              </a:spcBef>
+              <a:spcAft>
+                <a:spcPts val="0"/>
+              </a:spcAft>
+              <a:buClr>
+                <a:schemeClr val="accent1"/>
+              </a:buClr>
+              <a:buSzPct val="80000"/>
+              <a:buFont typeface="Wingdings 3" charset="2"/>
+              <a:buChar char=""/>
+              <a:defRPr sz="1800" b="0" i="0" kern="1200">
+                <a:solidFill>
+                  <a:schemeClr val="tx1">
+                    <a:lumMod val="75000"/>
+                    <a:lumOff val="25000"/>
+                  </a:schemeClr>
+                </a:solidFill>
+                <a:latin typeface="+mn-lt"/>
+                <a:ea typeface="+mn-ea"/>
+                <a:cs typeface="+mn-cs"/>
+              </a:defRPr>
+            </a:lvl1pPr>
+            <a:lvl2pPr marL="742950" indent="-285750" algn="l" defTabSz="457200" rtl="0" eaLnBrk="1" latinLnBrk="0" hangingPunct="1">
+              <a:spcBef>
+                <a:spcPts val="1000"/>
+              </a:spcBef>
+              <a:spcAft>
+                <a:spcPts val="0"/>
+              </a:spcAft>
+              <a:buClr>
+                <a:schemeClr val="accent1"/>
+              </a:buClr>
+              <a:buSzPct val="80000"/>
+              <a:buFont typeface="Wingdings 3" charset="2"/>
+              <a:buChar char=""/>
+              <a:defRPr sz="1600" b="0" i="0" kern="1200">
+                <a:solidFill>
+                  <a:schemeClr val="tx1">
+                    <a:lumMod val="75000"/>
+                    <a:lumOff val="25000"/>
+                  </a:schemeClr>
+                </a:solidFill>
+                <a:latin typeface="+mn-lt"/>
+                <a:ea typeface="+mn-ea"/>
+                <a:cs typeface="+mn-cs"/>
+              </a:defRPr>
+            </a:lvl2pPr>
+            <a:lvl3pPr marL="1143000" indent="-228600" algn="l" defTabSz="457200" rtl="0" eaLnBrk="1" latinLnBrk="0" hangingPunct="1">
+              <a:spcBef>
+                <a:spcPts val="1000"/>
+              </a:spcBef>
+              <a:spcAft>
+                <a:spcPts val="0"/>
+              </a:spcAft>
+              <a:buClr>
+                <a:schemeClr val="accent1"/>
+              </a:buClr>
+              <a:buSzPct val="80000"/>
+              <a:buFont typeface="Wingdings 3" charset="2"/>
+              <a:buChar char=""/>
+              <a:defRPr sz="1400" b="0" i="0" kern="1200">
+                <a:solidFill>
+                  <a:schemeClr val="tx1">
+                    <a:lumMod val="75000"/>
+                    <a:lumOff val="25000"/>
+                  </a:schemeClr>
+                </a:solidFill>
+                <a:latin typeface="+mn-lt"/>
+                <a:ea typeface="+mn-ea"/>
+                <a:cs typeface="+mn-cs"/>
+              </a:defRPr>
+            </a:lvl3pPr>
+            <a:lvl4pPr marL="1600200" indent="-228600" algn="l" defTabSz="457200" rtl="0" eaLnBrk="1" latinLnBrk="0" hangingPunct="1">
+              <a:spcBef>
+                <a:spcPts val="1000"/>
+              </a:spcBef>
+              <a:spcAft>
+                <a:spcPts val="0"/>
+              </a:spcAft>
+              <a:buClr>
+                <a:schemeClr val="accent1"/>
+              </a:buClr>
+              <a:buSzPct val="80000"/>
+              <a:buFont typeface="Wingdings 3" charset="2"/>
+              <a:buChar char=""/>
+              <a:defRPr sz="1200" b="0" i="0" kern="1200">
+                <a:solidFill>
+                  <a:schemeClr val="tx1">
+                    <a:lumMod val="75000"/>
+                    <a:lumOff val="25000"/>
+                  </a:schemeClr>
+                </a:solidFill>
+                <a:latin typeface="+mn-lt"/>
+                <a:ea typeface="+mn-ea"/>
+                <a:cs typeface="+mn-cs"/>
+              </a:defRPr>
+            </a:lvl4pPr>
+            <a:lvl5pPr marL="2057400" indent="-228600" algn="l" defTabSz="457200" rtl="0" eaLnBrk="1" latinLnBrk="0" hangingPunct="1">
+              <a:spcBef>
+                <a:spcPts val="1000"/>
+              </a:spcBef>
+              <a:spcAft>
+                <a:spcPts val="0"/>
+              </a:spcAft>
+              <a:buClr>
+                <a:schemeClr val="accent1"/>
+              </a:buClr>
+              <a:buSzPct val="80000"/>
+              <a:buFont typeface="Wingdings 3" charset="2"/>
+              <a:buChar char=""/>
+              <a:defRPr sz="1200" b="0" i="0" kern="1200">
+                <a:solidFill>
+                  <a:schemeClr val="tx1">
+                    <a:lumMod val="75000"/>
+                    <a:lumOff val="25000"/>
+                  </a:schemeClr>
+                </a:solidFill>
+                <a:latin typeface="+mn-lt"/>
+                <a:ea typeface="+mn-ea"/>
+                <a:cs typeface="+mn-cs"/>
+              </a:defRPr>
+            </a:lvl5pPr>
+            <a:lvl6pPr marL="2514600" indent="-228600" algn="l" defTabSz="457200" rtl="0" eaLnBrk="1" latinLnBrk="0" hangingPunct="1">
+              <a:spcBef>
+                <a:spcPts val="1000"/>
+              </a:spcBef>
+              <a:spcAft>
+                <a:spcPts val="0"/>
+              </a:spcAft>
+              <a:buClr>
+                <a:schemeClr val="accent1"/>
+              </a:buClr>
+              <a:buSzPct val="80000"/>
+              <a:buFont typeface="Wingdings 3" charset="2"/>
+              <a:buChar char=""/>
+              <a:defRPr sz="1200" b="0" i="0" kern="1200">
+                <a:solidFill>
+                  <a:schemeClr val="tx1">
+                    <a:lumMod val="75000"/>
+                    <a:lumOff val="25000"/>
+                  </a:schemeClr>
+                </a:solidFill>
+                <a:latin typeface="+mn-lt"/>
+                <a:ea typeface="+mn-ea"/>
+                <a:cs typeface="+mn-cs"/>
+              </a:defRPr>
+            </a:lvl6pPr>
+            <a:lvl7pPr marL="2971800" indent="-228600" algn="l" defTabSz="457200" rtl="0" eaLnBrk="1" latinLnBrk="0" hangingPunct="1">
+              <a:spcBef>
+                <a:spcPts val="1000"/>
+              </a:spcBef>
+              <a:spcAft>
+                <a:spcPts val="0"/>
+              </a:spcAft>
+              <a:buClr>
+                <a:schemeClr val="accent1"/>
+              </a:buClr>
+              <a:buSzPct val="80000"/>
+              <a:buFont typeface="Wingdings 3" charset="2"/>
+              <a:buChar char=""/>
+              <a:defRPr sz="1200" b="0" i="0" kern="1200">
+                <a:solidFill>
+                  <a:schemeClr val="tx1">
+                    <a:lumMod val="75000"/>
+                    <a:lumOff val="25000"/>
+                  </a:schemeClr>
+                </a:solidFill>
+                <a:latin typeface="+mn-lt"/>
+                <a:ea typeface="+mn-ea"/>
+                <a:cs typeface="+mn-cs"/>
+              </a:defRPr>
+            </a:lvl7pPr>
+            <a:lvl8pPr marL="3429000" indent="-228600" algn="l" defTabSz="457200" rtl="0" eaLnBrk="1" latinLnBrk="0" hangingPunct="1">
+              <a:spcBef>
+                <a:spcPts val="1000"/>
+              </a:spcBef>
+              <a:spcAft>
+                <a:spcPts val="0"/>
+              </a:spcAft>
+              <a:buClr>
+                <a:schemeClr val="accent1"/>
+              </a:buClr>
+              <a:buSzPct val="80000"/>
+              <a:buFont typeface="Wingdings 3" charset="2"/>
+              <a:buChar char=""/>
+              <a:defRPr sz="1200" b="0" i="0" kern="1200">
+                <a:solidFill>
+                  <a:schemeClr val="tx1">
+                    <a:lumMod val="75000"/>
+                    <a:lumOff val="25000"/>
+                  </a:schemeClr>
+                </a:solidFill>
+                <a:latin typeface="+mn-lt"/>
+                <a:ea typeface="+mn-ea"/>
+                <a:cs typeface="+mn-cs"/>
+              </a:defRPr>
+            </a:lvl8pPr>
+            <a:lvl9pPr marL="3886200" indent="-228600" algn="l" defTabSz="457200" rtl="0" eaLnBrk="1" latinLnBrk="0" hangingPunct="1">
+              <a:spcBef>
+                <a:spcPts val="1000"/>
+              </a:spcBef>
+              <a:spcAft>
+                <a:spcPts val="0"/>
+              </a:spcAft>
+              <a:buClr>
+                <a:schemeClr val="accent1"/>
+              </a:buClr>
+              <a:buSzPct val="80000"/>
+              <a:buFont typeface="Wingdings 3" charset="2"/>
+              <a:buChar char=""/>
+              <a:defRPr sz="1200" b="0" i="0" kern="1200">
+                <a:solidFill>
+                  <a:schemeClr val="tx1">
+                    <a:lumMod val="75000"/>
+                    <a:lumOff val="25000"/>
+                  </a:schemeClr>
+                </a:solidFill>
+                <a:latin typeface="+mn-lt"/>
+                <a:ea typeface="+mn-ea"/>
+                <a:cs typeface="+mn-cs"/>
+              </a:defRPr>
+            </a:lvl9pPr>
+          </a:lstStyle>
+          <a:p>
+            <a:pPr marL="0" indent="0" algn="ctr">
+              <a:buFont typeface="Wingdings 3" charset="2"/>
+              <a:buNone/>
+            </a:pPr>
+            <a:endParaRPr lang="en-US" sz="2800" b="1" i="1" dirty="0" smtClean="0"/>
+          </a:p>
+        </p:txBody>
+      </p:sp>
+      <p:pic>
+        <p:nvPicPr>
+          <p:cNvPr id="7" name="Picture 6"/>
+          <p:cNvPicPr>
+            <a:picLocks noChangeAspect="1"/>
+          </p:cNvPicPr>
+          <p:nvPr/>
+        </p:nvPicPr>
+        <p:blipFill>
+          <a:blip r:embed="rId3">
+            <a:extLst>
+              <a:ext uri="{28A0092B-C50C-407E-A947-70E740481C1C}">
+                <a14:useLocalDpi xmlns:a14="http://schemas.microsoft.com/office/drawing/2010/main" val="0"/>
+              </a:ext>
+            </a:extLst>
+          </a:blip>
+          <a:stretch>
+            <a:fillRect/>
+          </a:stretch>
+        </p:blipFill>
+        <p:spPr>
+          <a:xfrm>
+            <a:off x="166255" y="2925329"/>
+            <a:ext cx="6671220" cy="3752561"/>
+          </a:xfrm>
+          <a:prstGeom prst="rect">
+            <a:avLst/>
+          </a:prstGeom>
+        </p:spPr>
+      </p:pic>
+    </p:spTree>
+    <p:extLst>
+      <p:ext uri="{BB962C8B-B14F-4D97-AF65-F5344CB8AC3E}">
+        <p14:creationId xmlns:p14="http://schemas.microsoft.com/office/powerpoint/2010/main" val="3878737737"/>
+      </p:ext>
+    </p:extLst>
+  </p:cSld>
+  <p:clrMapOvr>
+    <a:masterClrMapping/>
+  </p:clrMapOvr>
+  <p:timing>
+    <p:tnLst>
+      <p:par>
+        <p:cTn id="1" dur="indefinite" restart="never" nodeType="tmRoot"/>
+      </p:par>
+    </p:tnLst>
+  </p:timing>
+</p:sld>
+</file>
+
+<file path=ppt/slides/slide13.xml><?xml version="1.0" encoding="utf-8"?>
+<p:sld xmlns:a="http://schemas.openxmlformats.org/drawingml/2006/main" xmlns:r="http://schemas.openxmlformats.org/officeDocument/2006/relationships" xmlns:p="http://schemas.openxmlformats.org/presentationml/2006/main">
+  <p:cSld>
+    <p:spTree>
+      <p:nvGrpSpPr>
+        <p:cNvPr id="1" name=""/>
+        <p:cNvGrpSpPr/>
+        <p:nvPr/>
+      </p:nvGrpSpPr>
+      <p:grpSpPr>
+        <a:xfrm>
+          <a:off x="0" y="0"/>
+          <a:ext cx="0" cy="0"/>
+          <a:chOff x="0" y="0"/>
+          <a:chExt cx="0" cy="0"/>
+        </a:xfrm>
+      </p:grpSpPr>
+      <p:sp>
+        <p:nvSpPr>
+          <p:cNvPr id="2" name="Title 1"/>
+          <p:cNvSpPr>
+            <a:spLocks noGrp="1"/>
+          </p:cNvSpPr>
+          <p:nvPr>
+            <p:ph type="title"/>
+          </p:nvPr>
+        </p:nvSpPr>
+        <p:spPr>
+          <a:xfrm>
+            <a:off x="1154954" y="973668"/>
+            <a:ext cx="8761413" cy="559568"/>
+          </a:xfrm>
+        </p:spPr>
+        <p:txBody>
+          <a:bodyPr/>
+          <a:lstStyle/>
+          <a:p>
+            <a:r>
+              <a:rPr lang="en-US" dirty="0" smtClean="0"/>
+              <a:t>What have we done so far?</a:t>
+            </a:r>
+            <a:endParaRPr lang="en-US" dirty="0"/>
+          </a:p>
+        </p:txBody>
+      </p:sp>
+      <p:sp>
+        <p:nvSpPr>
+          <p:cNvPr id="3" name="Content Placeholder 2"/>
+          <p:cNvSpPr>
+            <a:spLocks noGrp="1"/>
+          </p:cNvSpPr>
+          <p:nvPr>
+            <p:ph idx="1"/>
+          </p:nvPr>
+        </p:nvSpPr>
+        <p:spPr>
+          <a:xfrm>
+            <a:off x="766618" y="2262909"/>
+            <a:ext cx="10538691" cy="4036291"/>
+          </a:xfrm>
+        </p:spPr>
+        <p:txBody>
+          <a:bodyPr/>
+          <a:lstStyle/>
+          <a:p>
+            <a:pPr marL="914400" lvl="2" indent="0">
+              <a:buNone/>
+            </a:pPr>
+            <a:endParaRPr lang="en-US" dirty="0" smtClean="0"/>
+          </a:p>
+          <a:p>
+            <a:endParaRPr lang="en-US" dirty="0"/>
+          </a:p>
+        </p:txBody>
+      </p:sp>
+      <p:pic>
+        <p:nvPicPr>
+          <p:cNvPr id="4" name="Picture 3"/>
+          <p:cNvPicPr>
+            <a:picLocks noChangeAspect="1"/>
+          </p:cNvPicPr>
+          <p:nvPr/>
+        </p:nvPicPr>
+        <p:blipFill>
+          <a:blip r:embed="rId2">
+            <a:extLst>
+              <a:ext uri="{28A0092B-C50C-407E-A947-70E740481C1C}">
+                <a14:useLocalDpi xmlns:a14="http://schemas.microsoft.com/office/drawing/2010/main" val="0"/>
+              </a:ext>
+            </a:extLst>
+          </a:blip>
+          <a:stretch>
+            <a:fillRect/>
+          </a:stretch>
+        </p:blipFill>
+        <p:spPr>
+          <a:xfrm>
+            <a:off x="11093450" y="5759450"/>
+            <a:ext cx="1098550" cy="1098550"/>
+          </a:xfrm>
+          <a:prstGeom prst="rect">
+            <a:avLst/>
+          </a:prstGeom>
+        </p:spPr>
+      </p:pic>
+    </p:spTree>
+    <p:extLst>
+      <p:ext uri="{BB962C8B-B14F-4D97-AF65-F5344CB8AC3E}">
+        <p14:creationId xmlns:p14="http://schemas.microsoft.com/office/powerpoint/2010/main" val="2071669597"/>
+      </p:ext>
+    </p:extLst>
+  </p:cSld>
+  <p:clrMapOvr>
+    <a:masterClrMapping/>
+  </p:clrMapOvr>
+  <p:timing>
+    <p:tnLst>
+      <p:par>
+        <p:cTn id="1" dur="indefinite" restart="never" nodeType="tmRoot"/>
+      </p:par>
+    </p:tnLst>
+  </p:timing>
+</p:sld>
+</file>
+
+<file path=ppt/slides/slide14.xml><?xml version="1.0" encoding="utf-8"?>
+<p:sld xmlns:a="http://schemas.openxmlformats.org/drawingml/2006/main" xmlns:r="http://schemas.openxmlformats.org/officeDocument/2006/relationships" xmlns:p="http://schemas.openxmlformats.org/presentationml/2006/main">
+  <p:cSld>
+    <p:spTree>
+      <p:nvGrpSpPr>
+        <p:cNvPr id="1" name=""/>
+        <p:cNvGrpSpPr/>
+        <p:nvPr/>
+      </p:nvGrpSpPr>
+      <p:grpSpPr>
+        <a:xfrm>
+          <a:off x="0" y="0"/>
+          <a:ext cx="0" cy="0"/>
+          <a:chOff x="0" y="0"/>
+          <a:chExt cx="0" cy="0"/>
+        </a:xfrm>
+      </p:grpSpPr>
+      <p:sp>
+        <p:nvSpPr>
+          <p:cNvPr id="2" name="Title 1"/>
+          <p:cNvSpPr>
+            <a:spLocks noGrp="1"/>
+          </p:cNvSpPr>
+          <p:nvPr>
+            <p:ph type="title"/>
+          </p:nvPr>
+        </p:nvSpPr>
+        <p:spPr>
+          <a:xfrm>
+            <a:off x="1154954" y="973668"/>
+            <a:ext cx="8761413" cy="559568"/>
+          </a:xfrm>
+        </p:spPr>
+        <p:txBody>
+          <a:bodyPr/>
+          <a:lstStyle/>
+          <a:p>
+            <a:r>
+              <a:rPr lang="en-US" dirty="0" smtClean="0"/>
+              <a:t>Quick Wins</a:t>
+            </a:r>
+            <a:endParaRPr lang="en-US" dirty="0"/>
+          </a:p>
+        </p:txBody>
+      </p:sp>
+      <p:sp>
+        <p:nvSpPr>
+          <p:cNvPr id="3" name="Content Placeholder 2"/>
+          <p:cNvSpPr>
+            <a:spLocks noGrp="1"/>
+          </p:cNvSpPr>
+          <p:nvPr>
+            <p:ph idx="1"/>
+          </p:nvPr>
+        </p:nvSpPr>
+        <p:spPr>
+          <a:xfrm>
+            <a:off x="766618" y="2262909"/>
+            <a:ext cx="10538691" cy="4036291"/>
+          </a:xfrm>
+        </p:spPr>
+        <p:txBody>
+          <a:bodyPr/>
+          <a:lstStyle/>
+          <a:p>
+            <a:pPr marL="914400" lvl="2" indent="0">
+              <a:buNone/>
+            </a:pPr>
+            <a:endParaRPr lang="en-US" dirty="0" smtClean="0"/>
+          </a:p>
+          <a:p>
+            <a:endParaRPr lang="en-US" dirty="0"/>
+          </a:p>
+        </p:txBody>
+      </p:sp>
+      <p:pic>
+        <p:nvPicPr>
+          <p:cNvPr id="4" name="Picture 3"/>
+          <p:cNvPicPr>
+            <a:picLocks noChangeAspect="1"/>
+          </p:cNvPicPr>
+          <p:nvPr/>
+        </p:nvPicPr>
+        <p:blipFill>
+          <a:blip r:embed="rId2">
+            <a:extLst>
+              <a:ext uri="{28A0092B-C50C-407E-A947-70E740481C1C}">
+                <a14:useLocalDpi xmlns:a14="http://schemas.microsoft.com/office/drawing/2010/main" val="0"/>
+              </a:ext>
+            </a:extLst>
+          </a:blip>
+          <a:stretch>
+            <a:fillRect/>
+          </a:stretch>
+        </p:blipFill>
+        <p:spPr>
+          <a:xfrm>
+            <a:off x="11111923" y="5759450"/>
+            <a:ext cx="1098550" cy="1098550"/>
+          </a:xfrm>
+          <a:prstGeom prst="rect">
+            <a:avLst/>
+          </a:prstGeom>
+        </p:spPr>
+      </p:pic>
+    </p:spTree>
+    <p:extLst>
+      <p:ext uri="{BB962C8B-B14F-4D97-AF65-F5344CB8AC3E}">
+        <p14:creationId xmlns:p14="http://schemas.microsoft.com/office/powerpoint/2010/main" val="849261351"/>
+      </p:ext>
+    </p:extLst>
+  </p:cSld>
+  <p:clrMapOvr>
+    <a:masterClrMapping/>
+  </p:clrMapOvr>
+  <p:timing>
+    <p:tnLst>
+      <p:par>
+        <p:cTn id="1" dur="indefinite" restart="never" nodeType="tmRoot"/>
+      </p:par>
+    </p:tnLst>
+  </p:timing>
+</p:sld>
+</file>
+
 <file path=ppt/slides/slide2.xml><?xml version="1.0" encoding="utf-8"?>
+<p:sld xmlns:a="http://schemas.openxmlformats.org/drawingml/2006/main" xmlns:r="http://schemas.openxmlformats.org/officeDocument/2006/relationships" xmlns:p="http://schemas.openxmlformats.org/presentationml/2006/main">
+  <p:cSld>
+    <p:spTree>
+      <p:nvGrpSpPr>
+        <p:cNvPr id="1" name=""/>
+        <p:cNvGrpSpPr/>
+        <p:nvPr/>
+      </p:nvGrpSpPr>
+      <p:grpSpPr>
+        <a:xfrm>
+          <a:off x="0" y="0"/>
+          <a:ext cx="0" cy="0"/>
+          <a:chOff x="0" y="0"/>
+          <a:chExt cx="0" cy="0"/>
+        </a:xfrm>
+      </p:grpSpPr>
+      <p:sp>
+        <p:nvSpPr>
+          <p:cNvPr id="2" name="Title 1"/>
+          <p:cNvSpPr>
+            <a:spLocks noGrp="1"/>
+          </p:cNvSpPr>
+          <p:nvPr>
+            <p:ph type="title"/>
+          </p:nvPr>
+        </p:nvSpPr>
+        <p:spPr>
+          <a:xfrm>
+            <a:off x="1154954" y="2370667"/>
+            <a:ext cx="9965628" cy="1822514"/>
+          </a:xfrm>
+        </p:spPr>
+        <p:txBody>
+          <a:bodyPr/>
+          <a:lstStyle/>
+          <a:p>
+            <a:pPr algn="ctr"/>
+            <a:r>
+              <a:rPr lang="en-US" b="1" dirty="0" smtClean="0"/>
+              <a:t>Who are we?</a:t>
+            </a:r>
+            <a:endParaRPr lang="en-US" b="1" dirty="0"/>
+          </a:p>
+        </p:txBody>
+      </p:sp>
+      <p:pic>
+        <p:nvPicPr>
+          <p:cNvPr id="3" name="Picture 2"/>
+          <p:cNvPicPr>
+            <a:picLocks noChangeAspect="1"/>
+          </p:cNvPicPr>
+          <p:nvPr/>
+        </p:nvPicPr>
+        <p:blipFill>
+          <a:blip r:embed="rId2">
+            <a:extLst>
+              <a:ext uri="{28A0092B-C50C-407E-A947-70E740481C1C}">
+                <a14:useLocalDpi xmlns:a14="http://schemas.microsoft.com/office/drawing/2010/main" val="0"/>
+              </a:ext>
+            </a:extLst>
+          </a:blip>
+          <a:stretch>
+            <a:fillRect/>
+          </a:stretch>
+        </p:blipFill>
+        <p:spPr>
+          <a:xfrm>
+            <a:off x="11093450" y="5759450"/>
+            <a:ext cx="1098550" cy="1098550"/>
+          </a:xfrm>
+          <a:prstGeom prst="rect">
+            <a:avLst/>
+          </a:prstGeom>
+        </p:spPr>
+      </p:pic>
+    </p:spTree>
+    <p:extLst>
+      <p:ext uri="{BB962C8B-B14F-4D97-AF65-F5344CB8AC3E}">
+        <p14:creationId xmlns:p14="http://schemas.microsoft.com/office/powerpoint/2010/main" val="3571042197"/>
+      </p:ext>
+    </p:extLst>
+  </p:cSld>
+  <p:clrMapOvr>
+    <a:masterClrMapping/>
+  </p:clrMapOvr>
+</p:sld>
+</file>
+
+<file path=ppt/slides/slide3.xml><?xml version="1.0" encoding="utf-8"?>
 <p:sld xmlns:a="http://schemas.openxmlformats.org/drawingml/2006/main" xmlns:r="http://schemas.openxmlformats.org/officeDocument/2006/relationships" xmlns:p="http://schemas.openxmlformats.org/presentationml/2006/main">
   <p:cSld>
     <p:spTree>
@@ -13499,8 +14957,8 @@
         </p:nvSpPr>
         <p:spPr>
           <a:xfrm>
-            <a:off x="7222067" y="1464733"/>
-            <a:ext cx="3767666" cy="923330"/>
+            <a:off x="6483927" y="474132"/>
+            <a:ext cx="5375563" cy="4955203"/>
           </a:xfrm>
           <a:prstGeom prst="rect">
             <a:avLst/>
@@ -13514,11 +14972,120 @@
           <a:lstStyle/>
           <a:p>
             <a:r>
+              <a:rPr lang="en-US" sz="2800" b="1" dirty="0" smtClean="0"/>
+              <a:t>Mission</a:t>
+            </a:r>
+            <a:r>
+              <a:rPr lang="en-US" sz="2800" b="1" dirty="0" smtClean="0"/>
+              <a:t>:</a:t>
+            </a:r>
+          </a:p>
+          <a:p>
+            <a:endParaRPr lang="en-US" dirty="0"/>
+          </a:p>
+          <a:p>
+            <a:pPr marL="285750" indent="-285750" algn="just">
+              <a:buFont typeface="Arial" panose="020B0604020202020204" pitchFamily="34" charset="0"/>
+              <a:buChar char="•"/>
+            </a:pPr>
+            <a:r>
               <a:rPr lang="en-US" dirty="0" smtClean="0"/>
-              <a:t>Mission:</a:t>
-            </a:r>
-          </a:p>
-          <a:p>
+              <a:t>To achieve </a:t>
+            </a:r>
+            <a:r>
+              <a:rPr lang="en-US" dirty="0"/>
+              <a:t>improved </a:t>
+            </a:r>
+            <a:r>
+              <a:rPr lang="en-US" dirty="0" smtClean="0"/>
+              <a:t>representation and empower </a:t>
+            </a:r>
+            <a:r>
+              <a:rPr lang="en-US" dirty="0"/>
+              <a:t>the African population of all </a:t>
+            </a:r>
+            <a:r>
+              <a:rPr lang="en-US" dirty="0" smtClean="0"/>
+              <a:t>genders, </a:t>
+            </a:r>
+            <a:r>
+              <a:rPr lang="en-US" dirty="0"/>
+              <a:t>who are underrepresented in the global </a:t>
+            </a:r>
+            <a:r>
+              <a:rPr lang="en-US" dirty="0" smtClean="0"/>
+              <a:t>R community.</a:t>
+            </a:r>
+          </a:p>
+          <a:p>
+            <a:pPr marL="285750" indent="-285750" algn="just">
+              <a:buFont typeface="Arial" panose="020B0604020202020204" pitchFamily="34" charset="0"/>
+              <a:buChar char="•"/>
+            </a:pPr>
+            <a:endParaRPr lang="en-US" dirty="0" smtClean="0"/>
+          </a:p>
+          <a:p>
+            <a:pPr marL="285750" indent="-285750" algn="just">
+              <a:buFont typeface="Arial" panose="020B0604020202020204" pitchFamily="34" charset="0"/>
+              <a:buChar char="•"/>
+            </a:pPr>
+            <a:r>
+              <a:rPr lang="en-US" dirty="0" smtClean="0"/>
+              <a:t>Support </a:t>
+            </a:r>
+            <a:r>
+              <a:rPr lang="en-US" dirty="0"/>
+              <a:t>already existing R Users across Africa, and R </a:t>
+            </a:r>
+            <a:r>
+              <a:rPr lang="en-US" dirty="0" smtClean="0"/>
+              <a:t>enthusiasts </a:t>
+            </a:r>
+            <a:r>
+              <a:rPr lang="en-US" dirty="0"/>
+              <a:t>to embrace the full potential of R programming</a:t>
+            </a:r>
+          </a:p>
+          <a:p>
+            <a:pPr marL="285750" indent="-285750" algn="just">
+              <a:buFont typeface="Arial" panose="020B0604020202020204" pitchFamily="34" charset="0"/>
+              <a:buChar char="•"/>
+            </a:pPr>
+            <a:endParaRPr lang="en-US" dirty="0" smtClean="0"/>
+          </a:p>
+          <a:p>
+            <a:pPr marL="285750" indent="-285750" algn="just">
+              <a:buFont typeface="Arial" panose="020B0604020202020204" pitchFamily="34" charset="0"/>
+              <a:buChar char="•"/>
+            </a:pPr>
+            <a:r>
+              <a:rPr lang="en-US" dirty="0"/>
+              <a:t>T</a:t>
+            </a:r>
+            <a:r>
+              <a:rPr lang="en-US" dirty="0" smtClean="0"/>
+              <a:t>hrough </a:t>
+            </a:r>
+            <a:r>
+              <a:rPr lang="en-US" dirty="0"/>
+              <a:t>fostering a </a:t>
+            </a:r>
+            <a:r>
+              <a:rPr lang="en-US" dirty="0" smtClean="0"/>
+              <a:t>collaborative continental </a:t>
+            </a:r>
+            <a:r>
+              <a:rPr lang="en-US" dirty="0"/>
+              <a:t>network of R gurus, mentors, learners, developers and leaders, to help </a:t>
+            </a:r>
+            <a:r>
+              <a:rPr lang="en-US" dirty="0" smtClean="0"/>
+              <a:t>facilitate individual </a:t>
+            </a:r>
+            <a:r>
+              <a:rPr lang="en-US" dirty="0"/>
+              <a:t>and collective progress worldwide.</a:t>
+            </a:r>
             <a:endParaRPr lang="en-US" dirty="0"/>
           </a:p>
           <a:p>
@@ -13546,7 +15113,7 @@
 </p:sld>
 </file>
 
-<file path=ppt/slides/slide3.xml><?xml version="1.0" encoding="utf-8"?>
+<file path=ppt/slides/slide4.xml><?xml version="1.0" encoding="utf-8"?>
 <p:sld xmlns:a="http://schemas.openxmlformats.org/drawingml/2006/main" xmlns:r="http://schemas.openxmlformats.org/officeDocument/2006/relationships" xmlns:p="http://schemas.openxmlformats.org/presentationml/2006/main">
   <p:cSld>
     <p:spTree>
@@ -13578,7 +15145,19 @@
           <a:bodyPr/>
           <a:lstStyle/>
           <a:p>
-            <a:endParaRPr lang="en-US"/>
+            <a:r>
+              <a:rPr lang="en-US" dirty="0" smtClean="0"/>
+              <a:t>Why </a:t>
+            </a:r>
+            <a:r>
+              <a:rPr lang="en-US" dirty="0" err="1" smtClean="0"/>
+              <a:t>AfricaR</a:t>
+            </a:r>
+            <a:r>
+              <a:rPr lang="en-US" dirty="0"/>
+              <a:t>?</a:t>
+            </a:r>
+            <a:endParaRPr lang="en-US" dirty="0"/>
           </a:p>
         </p:txBody>
       </p:sp>
@@ -13592,30 +15171,604 @@
             <p:ph idx="1"/>
           </p:nvPr>
         </p:nvSpPr>
-        <p:spPr/>
+        <p:spPr>
+          <a:xfrm>
+            <a:off x="766618" y="2262909"/>
+            <a:ext cx="10538691" cy="4036291"/>
+          </a:xfrm>
+        </p:spPr>
         <p:txBody>
           <a:bodyPr/>
           <a:lstStyle/>
           <a:p>
             <a:r>
+              <a:rPr lang="en-US" dirty="0" smtClean="0"/>
+              <a:t>Many R Users in Africa, who did not know of the larger global #</a:t>
+            </a:r>
+            <a:r>
               <a:rPr lang="en-US" dirty="0" err="1" smtClean="0"/>
-              <a:t>Cgccycfc</a:t>
+              <a:t>rstats</a:t>
             </a:r>
             <a:r>
               <a:rPr lang="en-US" dirty="0" smtClean="0"/>
-              <a:t> v </a:t>
-            </a:r>
+              <a:t> community.</a:t>
+            </a:r>
+          </a:p>
+          <a:p>
+            <a:r>
+              <a:rPr lang="en-US" dirty="0" smtClean="0"/>
+              <a:t>Lack of awareness about R Conferences that we can apply for, and attend, through diversity scholarships.</a:t>
+            </a:r>
+          </a:p>
+          <a:p>
+            <a:r>
+              <a:rPr lang="en-US" dirty="0" smtClean="0"/>
+              <a:t>People learning R, but are not aware of where to apply the skills they learn.</a:t>
+            </a:r>
+          </a:p>
+          <a:p>
+            <a:r>
+              <a:rPr lang="en-US" dirty="0" smtClean="0"/>
+              <a:t>Education system is lacking. Some campuses teach R, but the curriculum is not exhaustive.</a:t>
+            </a:r>
+          </a:p>
+          <a:p>
+            <a:r>
+              <a:rPr lang="en-US" dirty="0" smtClean="0"/>
+              <a:t>“Battle” between R and Python:</a:t>
+            </a:r>
+          </a:p>
+          <a:p>
+            <a:pPr lvl="1"/>
+            <a:r>
+              <a:rPr lang="en-US" dirty="0" smtClean="0"/>
+              <a:t>Employers JDs prioritize Python over R</a:t>
+            </a:r>
+          </a:p>
+          <a:p>
+            <a:pPr lvl="1"/>
+            <a:r>
+              <a:rPr lang="en-US" dirty="0" smtClean="0"/>
+              <a:t>Python community stronger than R community. Conferences such as</a:t>
+            </a:r>
+          </a:p>
+          <a:p>
+            <a:pPr lvl="2"/>
             <a:r>
               <a:rPr lang="en-US" dirty="0" err="1" smtClean="0"/>
-              <a:t>cgcyghvgv</a:t>
-            </a:r>
+              <a:t>Pycon</a:t>
+            </a:r>
+            <a:endParaRPr lang="en-US" dirty="0" smtClean="0"/>
+          </a:p>
+          <a:p>
+            <a:pPr lvl="2"/>
+            <a:r>
+              <a:rPr lang="en-US" dirty="0" err="1" smtClean="0"/>
+              <a:t>IndabaX</a:t>
+            </a:r>
+            <a:endParaRPr lang="en-US" dirty="0" smtClean="0"/>
+          </a:p>
+          <a:p>
+            <a:pPr marL="914400" lvl="2" indent="0">
+              <a:buNone/>
+            </a:pPr>
+            <a:endParaRPr lang="en-US" dirty="0" smtClean="0"/>
+          </a:p>
+          <a:p>
+            <a:endParaRPr lang="en-US" dirty="0"/>
+          </a:p>
+        </p:txBody>
+      </p:sp>
+      <p:pic>
+        <p:nvPicPr>
+          <p:cNvPr id="4" name="Picture 3"/>
+          <p:cNvPicPr>
+            <a:picLocks noChangeAspect="1"/>
+          </p:cNvPicPr>
+          <p:nvPr/>
+        </p:nvPicPr>
+        <p:blipFill>
+          <a:blip r:embed="rId2">
+            <a:extLst>
+              <a:ext uri="{28A0092B-C50C-407E-A947-70E740481C1C}">
+                <a14:useLocalDpi xmlns:a14="http://schemas.microsoft.com/office/drawing/2010/main" val="0"/>
+              </a:ext>
+            </a:extLst>
+          </a:blip>
+          <a:stretch>
+            <a:fillRect/>
+          </a:stretch>
+        </p:blipFill>
+        <p:spPr>
+          <a:xfrm>
+            <a:off x="11093450" y="5749925"/>
+            <a:ext cx="1098550" cy="1098550"/>
+          </a:xfrm>
+          <a:prstGeom prst="rect">
+            <a:avLst/>
+          </a:prstGeom>
+        </p:spPr>
+      </p:pic>
+    </p:spTree>
+    <p:extLst>
+      <p:ext uri="{BB962C8B-B14F-4D97-AF65-F5344CB8AC3E}">
+        <p14:creationId xmlns:p14="http://schemas.microsoft.com/office/powerpoint/2010/main" val="1292670139"/>
+      </p:ext>
+    </p:extLst>
+  </p:cSld>
+  <p:clrMapOvr>
+    <a:masterClrMapping/>
+  </p:clrMapOvr>
+  <p:timing>
+    <p:tnLst>
+      <p:par>
+        <p:cTn id="1" dur="indefinite" restart="never" nodeType="tmRoot"/>
+      </p:par>
+    </p:tnLst>
+  </p:timing>
+</p:sld>
+</file>
+
+<file path=ppt/slides/slide5.xml><?xml version="1.0" encoding="utf-8"?>
+<p:sld xmlns:a="http://schemas.openxmlformats.org/drawingml/2006/main" xmlns:r="http://schemas.openxmlformats.org/officeDocument/2006/relationships" xmlns:p="http://schemas.openxmlformats.org/presentationml/2006/main">
+  <p:cSld>
+    <p:spTree>
+      <p:nvGrpSpPr>
+        <p:cNvPr id="1" name=""/>
+        <p:cNvGrpSpPr/>
+        <p:nvPr/>
+      </p:nvGrpSpPr>
+      <p:grpSpPr>
+        <a:xfrm>
+          <a:off x="0" y="0"/>
+          <a:ext cx="0" cy="0"/>
+          <a:chOff x="0" y="0"/>
+          <a:chExt cx="0" cy="0"/>
+        </a:xfrm>
+      </p:grpSpPr>
+      <p:sp>
+        <p:nvSpPr>
+          <p:cNvPr id="2" name="Title 1"/>
+          <p:cNvSpPr>
+            <a:spLocks noGrp="1"/>
+          </p:cNvSpPr>
+          <p:nvPr>
+            <p:ph type="title"/>
+          </p:nvPr>
+        </p:nvSpPr>
+        <p:spPr>
+          <a:xfrm>
+            <a:off x="1154954" y="2370667"/>
+            <a:ext cx="9965628" cy="1822514"/>
+          </a:xfrm>
+        </p:spPr>
+        <p:txBody>
+          <a:bodyPr/>
+          <a:lstStyle/>
+          <a:p>
+            <a:r>
+              <a:rPr lang="en-US" b="1" dirty="0"/>
+              <a:t>What ideas do we have for </a:t>
+            </a:r>
+            <a:r>
+              <a:rPr lang="en-US" b="1" dirty="0" err="1"/>
+              <a:t>AfricaR</a:t>
+            </a:r>
+            <a:r>
+              <a:rPr lang="en-US" b="1" dirty="0"/>
+              <a:t>?</a:t>
+            </a:r>
+            <a:endParaRPr lang="en-US" b="1" dirty="0"/>
+          </a:p>
+        </p:txBody>
+      </p:sp>
+      <p:pic>
+        <p:nvPicPr>
+          <p:cNvPr id="4" name="Picture 3"/>
+          <p:cNvPicPr>
+            <a:picLocks noChangeAspect="1"/>
+          </p:cNvPicPr>
+          <p:nvPr/>
+        </p:nvPicPr>
+        <p:blipFill>
+          <a:blip r:embed="rId2">
+            <a:extLst>
+              <a:ext uri="{28A0092B-C50C-407E-A947-70E740481C1C}">
+                <a14:useLocalDpi xmlns:a14="http://schemas.microsoft.com/office/drawing/2010/main" val="0"/>
+              </a:ext>
+            </a:extLst>
+          </a:blip>
+          <a:stretch>
+            <a:fillRect/>
+          </a:stretch>
+        </p:blipFill>
+        <p:spPr>
+          <a:xfrm>
+            <a:off x="11093450" y="5759450"/>
+            <a:ext cx="1098550" cy="1098550"/>
+          </a:xfrm>
+          <a:prstGeom prst="rect">
+            <a:avLst/>
+          </a:prstGeom>
+        </p:spPr>
+      </p:pic>
+    </p:spTree>
+    <p:extLst>
+      <p:ext uri="{BB962C8B-B14F-4D97-AF65-F5344CB8AC3E}">
+        <p14:creationId xmlns:p14="http://schemas.microsoft.com/office/powerpoint/2010/main" val="3212431357"/>
+      </p:ext>
+    </p:extLst>
+  </p:cSld>
+  <p:clrMapOvr>
+    <a:masterClrMapping/>
+  </p:clrMapOvr>
+</p:sld>
+</file>
+
+<file path=ppt/slides/slide6.xml><?xml version="1.0" encoding="utf-8"?>
+<p:sld xmlns:a="http://schemas.openxmlformats.org/drawingml/2006/main" xmlns:r="http://schemas.openxmlformats.org/officeDocument/2006/relationships" xmlns:p="http://schemas.openxmlformats.org/presentationml/2006/main">
+  <p:cSld>
+    <p:spTree>
+      <p:nvGrpSpPr>
+        <p:cNvPr id="1" name=""/>
+        <p:cNvGrpSpPr/>
+        <p:nvPr/>
+      </p:nvGrpSpPr>
+      <p:grpSpPr>
+        <a:xfrm>
+          <a:off x="0" y="0"/>
+          <a:ext cx="0" cy="0"/>
+          <a:chOff x="0" y="0"/>
+          <a:chExt cx="0" cy="0"/>
+        </a:xfrm>
+      </p:grpSpPr>
+      <p:sp>
+        <p:nvSpPr>
+          <p:cNvPr id="2" name="Title 1"/>
+          <p:cNvSpPr>
+            <a:spLocks noGrp="1"/>
+          </p:cNvSpPr>
+          <p:nvPr>
+            <p:ph type="title"/>
+          </p:nvPr>
+        </p:nvSpPr>
+        <p:spPr>
+          <a:xfrm>
+            <a:off x="480291" y="665018"/>
+            <a:ext cx="9158986" cy="1087146"/>
+          </a:xfrm>
+        </p:spPr>
+        <p:txBody>
+          <a:bodyPr/>
+          <a:lstStyle/>
+          <a:p>
             <a:r>
               <a:rPr lang="en-US" dirty="0" smtClean="0"/>
-              <a:t> </a:t>
-            </a:r>
-            <a:r>
-              <a:rPr lang="en-US" dirty="0" err="1" smtClean="0"/>
-              <a:t>fg</a:t>
+              <a:t>01: </a:t>
+            </a:r>
+            <a:r>
+              <a:rPr lang="en-US" b="1" i="1" dirty="0"/>
+              <a:t>Adopt an Africa R User Group</a:t>
+            </a:r>
+            <a:br>
+              <a:rPr lang="en-US" b="1" i="1" dirty="0"/>
+            </a:br>
+            <a:endParaRPr lang="en-US" dirty="0"/>
+          </a:p>
+        </p:txBody>
+      </p:sp>
+      <p:pic>
+        <p:nvPicPr>
+          <p:cNvPr id="4" name="Picture 3"/>
+          <p:cNvPicPr>
+            <a:picLocks noChangeAspect="1"/>
+          </p:cNvPicPr>
+          <p:nvPr/>
+        </p:nvPicPr>
+        <p:blipFill>
+          <a:blip r:embed="rId2">
+            <a:extLst>
+              <a:ext uri="{28A0092B-C50C-407E-A947-70E740481C1C}">
+                <a14:useLocalDpi xmlns:a14="http://schemas.microsoft.com/office/drawing/2010/main" val="0"/>
+              </a:ext>
+            </a:extLst>
+          </a:blip>
+          <a:stretch>
+            <a:fillRect/>
+          </a:stretch>
+        </p:blipFill>
+        <p:spPr>
+          <a:xfrm>
+            <a:off x="11093450" y="5759450"/>
+            <a:ext cx="1098550" cy="1098550"/>
+          </a:xfrm>
+          <a:prstGeom prst="rect">
+            <a:avLst/>
+          </a:prstGeom>
+        </p:spPr>
+      </p:pic>
+      <p:pic>
+        <p:nvPicPr>
+          <p:cNvPr id="7" name="Picture 6"/>
+          <p:cNvPicPr>
+            <a:picLocks noChangeAspect="1"/>
+          </p:cNvPicPr>
+          <p:nvPr/>
+        </p:nvPicPr>
+        <p:blipFill>
+          <a:blip r:embed="rId3">
+            <a:extLst>
+              <a:ext uri="{28A0092B-C50C-407E-A947-70E740481C1C}">
+                <a14:useLocalDpi xmlns:a14="http://schemas.microsoft.com/office/drawing/2010/main" val="0"/>
+              </a:ext>
+            </a:extLst>
+          </a:blip>
+          <a:stretch>
+            <a:fillRect/>
+          </a:stretch>
+        </p:blipFill>
+        <p:spPr>
+          <a:xfrm>
+            <a:off x="127566" y="2914937"/>
+            <a:ext cx="5992751" cy="3578225"/>
+          </a:xfrm>
+          <a:prstGeom prst="rect">
+            <a:avLst/>
+          </a:prstGeom>
+        </p:spPr>
+      </p:pic>
+      <p:sp>
+        <p:nvSpPr>
+          <p:cNvPr id="11" name="Content Placeholder 7"/>
+          <p:cNvSpPr txBox="1">
+            <a:spLocks/>
+          </p:cNvSpPr>
+          <p:nvPr/>
+        </p:nvSpPr>
+        <p:spPr>
+          <a:xfrm>
+            <a:off x="6488803" y="2914937"/>
+            <a:ext cx="4466102" cy="3187275"/>
+          </a:xfrm>
+          <a:prstGeom prst="rect">
+            <a:avLst/>
+          </a:prstGeom>
+        </p:spPr>
+        <p:txBody>
+          <a:bodyPr vert="horz" lIns="91440" tIns="45720" rIns="91440" bIns="45720" rtlCol="0">
+            <a:normAutofit/>
+          </a:bodyPr>
+          <a:lstStyle>
+            <a:lvl1pPr marL="342900" indent="-342900" algn="l" defTabSz="457200" rtl="0" eaLnBrk="1" latinLnBrk="0" hangingPunct="1">
+              <a:spcBef>
+                <a:spcPts val="1000"/>
+              </a:spcBef>
+              <a:spcAft>
+                <a:spcPts val="0"/>
+              </a:spcAft>
+              <a:buClr>
+                <a:schemeClr val="accent1"/>
+              </a:buClr>
+              <a:buSzPct val="80000"/>
+              <a:buFont typeface="Wingdings 3" charset="2"/>
+              <a:buChar char=""/>
+              <a:defRPr sz="1800" b="0" i="0" kern="1200">
+                <a:solidFill>
+                  <a:schemeClr val="tx1">
+                    <a:lumMod val="75000"/>
+                    <a:lumOff val="25000"/>
+                  </a:schemeClr>
+                </a:solidFill>
+                <a:latin typeface="+mn-lt"/>
+                <a:ea typeface="+mn-ea"/>
+                <a:cs typeface="+mn-cs"/>
+              </a:defRPr>
+            </a:lvl1pPr>
+            <a:lvl2pPr marL="742950" indent="-285750" algn="l" defTabSz="457200" rtl="0" eaLnBrk="1" latinLnBrk="0" hangingPunct="1">
+              <a:spcBef>
+                <a:spcPts val="1000"/>
+              </a:spcBef>
+              <a:spcAft>
+                <a:spcPts val="0"/>
+              </a:spcAft>
+              <a:buClr>
+                <a:schemeClr val="accent1"/>
+              </a:buClr>
+              <a:buSzPct val="80000"/>
+              <a:buFont typeface="Wingdings 3" charset="2"/>
+              <a:buChar char=""/>
+              <a:defRPr sz="1600" b="0" i="0" kern="1200">
+                <a:solidFill>
+                  <a:schemeClr val="tx1">
+                    <a:lumMod val="75000"/>
+                    <a:lumOff val="25000"/>
+                  </a:schemeClr>
+                </a:solidFill>
+                <a:latin typeface="+mn-lt"/>
+                <a:ea typeface="+mn-ea"/>
+                <a:cs typeface="+mn-cs"/>
+              </a:defRPr>
+            </a:lvl2pPr>
+            <a:lvl3pPr marL="1143000" indent="-228600" algn="l" defTabSz="457200" rtl="0" eaLnBrk="1" latinLnBrk="0" hangingPunct="1">
+              <a:spcBef>
+                <a:spcPts val="1000"/>
+              </a:spcBef>
+              <a:spcAft>
+                <a:spcPts val="0"/>
+              </a:spcAft>
+              <a:buClr>
+                <a:schemeClr val="accent1"/>
+              </a:buClr>
+              <a:buSzPct val="80000"/>
+              <a:buFont typeface="Wingdings 3" charset="2"/>
+              <a:buChar char=""/>
+              <a:defRPr sz="1400" b="0" i="0" kern="1200">
+                <a:solidFill>
+                  <a:schemeClr val="tx1">
+                    <a:lumMod val="75000"/>
+                    <a:lumOff val="25000"/>
+                  </a:schemeClr>
+                </a:solidFill>
+                <a:latin typeface="+mn-lt"/>
+                <a:ea typeface="+mn-ea"/>
+                <a:cs typeface="+mn-cs"/>
+              </a:defRPr>
+            </a:lvl3pPr>
+            <a:lvl4pPr marL="1600200" indent="-228600" algn="l" defTabSz="457200" rtl="0" eaLnBrk="1" latinLnBrk="0" hangingPunct="1">
+              <a:spcBef>
+                <a:spcPts val="1000"/>
+              </a:spcBef>
+              <a:spcAft>
+                <a:spcPts val="0"/>
+              </a:spcAft>
+              <a:buClr>
+                <a:schemeClr val="accent1"/>
+              </a:buClr>
+              <a:buSzPct val="80000"/>
+              <a:buFont typeface="Wingdings 3" charset="2"/>
+              <a:buChar char=""/>
+              <a:defRPr sz="1200" b="0" i="0" kern="1200">
+                <a:solidFill>
+                  <a:schemeClr val="tx1">
+                    <a:lumMod val="75000"/>
+                    <a:lumOff val="25000"/>
+                  </a:schemeClr>
+                </a:solidFill>
+                <a:latin typeface="+mn-lt"/>
+                <a:ea typeface="+mn-ea"/>
+                <a:cs typeface="+mn-cs"/>
+              </a:defRPr>
+            </a:lvl4pPr>
+            <a:lvl5pPr marL="2057400" indent="-228600" algn="l" defTabSz="457200" rtl="0" eaLnBrk="1" latinLnBrk="0" hangingPunct="1">
+              <a:spcBef>
+                <a:spcPts val="1000"/>
+              </a:spcBef>
+              <a:spcAft>
+                <a:spcPts val="0"/>
+              </a:spcAft>
+              <a:buClr>
+                <a:schemeClr val="accent1"/>
+              </a:buClr>
+              <a:buSzPct val="80000"/>
+              <a:buFont typeface="Wingdings 3" charset="2"/>
+              <a:buChar char=""/>
+              <a:defRPr sz="1200" b="0" i="0" kern="1200">
+                <a:solidFill>
+                  <a:schemeClr val="tx1">
+                    <a:lumMod val="75000"/>
+                    <a:lumOff val="25000"/>
+                  </a:schemeClr>
+                </a:solidFill>
+                <a:latin typeface="+mn-lt"/>
+                <a:ea typeface="+mn-ea"/>
+                <a:cs typeface="+mn-cs"/>
+              </a:defRPr>
+            </a:lvl5pPr>
+            <a:lvl6pPr marL="2514600" indent="-228600" algn="l" defTabSz="457200" rtl="0" eaLnBrk="1" latinLnBrk="0" hangingPunct="1">
+              <a:spcBef>
+                <a:spcPts val="1000"/>
+              </a:spcBef>
+              <a:spcAft>
+                <a:spcPts val="0"/>
+              </a:spcAft>
+              <a:buClr>
+                <a:schemeClr val="accent1"/>
+              </a:buClr>
+              <a:buSzPct val="80000"/>
+              <a:buFont typeface="Wingdings 3" charset="2"/>
+              <a:buChar char=""/>
+              <a:defRPr sz="1200" b="0" i="0" kern="1200">
+                <a:solidFill>
+                  <a:schemeClr val="tx1">
+                    <a:lumMod val="75000"/>
+                    <a:lumOff val="25000"/>
+                  </a:schemeClr>
+                </a:solidFill>
+                <a:latin typeface="+mn-lt"/>
+                <a:ea typeface="+mn-ea"/>
+                <a:cs typeface="+mn-cs"/>
+              </a:defRPr>
+            </a:lvl6pPr>
+            <a:lvl7pPr marL="2971800" indent="-228600" algn="l" defTabSz="457200" rtl="0" eaLnBrk="1" latinLnBrk="0" hangingPunct="1">
+              <a:spcBef>
+                <a:spcPts val="1000"/>
+              </a:spcBef>
+              <a:spcAft>
+                <a:spcPts val="0"/>
+              </a:spcAft>
+              <a:buClr>
+                <a:schemeClr val="accent1"/>
+              </a:buClr>
+              <a:buSzPct val="80000"/>
+              <a:buFont typeface="Wingdings 3" charset="2"/>
+              <a:buChar char=""/>
+              <a:defRPr sz="1200" b="0" i="0" kern="1200">
+                <a:solidFill>
+                  <a:schemeClr val="tx1">
+                    <a:lumMod val="75000"/>
+                    <a:lumOff val="25000"/>
+                  </a:schemeClr>
+                </a:solidFill>
+                <a:latin typeface="+mn-lt"/>
+                <a:ea typeface="+mn-ea"/>
+                <a:cs typeface="+mn-cs"/>
+              </a:defRPr>
+            </a:lvl7pPr>
+            <a:lvl8pPr marL="3429000" indent="-228600" algn="l" defTabSz="457200" rtl="0" eaLnBrk="1" latinLnBrk="0" hangingPunct="1">
+              <a:spcBef>
+                <a:spcPts val="1000"/>
+              </a:spcBef>
+              <a:spcAft>
+                <a:spcPts val="0"/>
+              </a:spcAft>
+              <a:buClr>
+                <a:schemeClr val="accent1"/>
+              </a:buClr>
+              <a:buSzPct val="80000"/>
+              <a:buFont typeface="Wingdings 3" charset="2"/>
+              <a:buChar char=""/>
+              <a:defRPr sz="1200" b="0" i="0" kern="1200">
+                <a:solidFill>
+                  <a:schemeClr val="tx1">
+                    <a:lumMod val="75000"/>
+                    <a:lumOff val="25000"/>
+                  </a:schemeClr>
+                </a:solidFill>
+                <a:latin typeface="+mn-lt"/>
+                <a:ea typeface="+mn-ea"/>
+                <a:cs typeface="+mn-cs"/>
+              </a:defRPr>
+            </a:lvl8pPr>
+            <a:lvl9pPr marL="3886200" indent="-228600" algn="l" defTabSz="457200" rtl="0" eaLnBrk="1" latinLnBrk="0" hangingPunct="1">
+              <a:spcBef>
+                <a:spcPts val="1000"/>
+              </a:spcBef>
+              <a:spcAft>
+                <a:spcPts val="0"/>
+              </a:spcAft>
+              <a:buClr>
+                <a:schemeClr val="accent1"/>
+              </a:buClr>
+              <a:buSzPct val="80000"/>
+              <a:buFont typeface="Wingdings 3" charset="2"/>
+              <a:buChar char=""/>
+              <a:defRPr sz="1200" b="0" i="0" kern="1200">
+                <a:solidFill>
+                  <a:schemeClr val="tx1">
+                    <a:lumMod val="75000"/>
+                    <a:lumOff val="25000"/>
+                  </a:schemeClr>
+                </a:solidFill>
+                <a:latin typeface="+mn-lt"/>
+                <a:ea typeface="+mn-ea"/>
+                <a:cs typeface="+mn-cs"/>
+              </a:defRPr>
+            </a:lvl9pPr>
+          </a:lstStyle>
+          <a:p>
+            <a:r>
+              <a:rPr lang="en-US" dirty="0" smtClean="0"/>
+              <a:t>Developed R User Groups mentoring/supporting new R User Groups</a:t>
             </a:r>
             <a:endParaRPr lang="en-US" dirty="0"/>
           </a:p>
@@ -13624,7 +15777,1508 @@
     </p:spTree>
     <p:extLst>
       <p:ext uri="{BB962C8B-B14F-4D97-AF65-F5344CB8AC3E}">
-        <p14:creationId xmlns:p14="http://schemas.microsoft.com/office/powerpoint/2010/main" val="1292670139"/>
+        <p14:creationId xmlns:p14="http://schemas.microsoft.com/office/powerpoint/2010/main" val="3383901384"/>
+      </p:ext>
+    </p:extLst>
+  </p:cSld>
+  <p:clrMapOvr>
+    <a:masterClrMapping/>
+  </p:clrMapOvr>
+  <p:timing>
+    <p:tnLst>
+      <p:par>
+        <p:cTn id="1" dur="indefinite" restart="never" nodeType="tmRoot"/>
+      </p:par>
+    </p:tnLst>
+  </p:timing>
+</p:sld>
+</file>
+
+<file path=ppt/slides/slide7.xml><?xml version="1.0" encoding="utf-8"?>
+<p:sld xmlns:a="http://schemas.openxmlformats.org/drawingml/2006/main" xmlns:r="http://schemas.openxmlformats.org/officeDocument/2006/relationships" xmlns:p="http://schemas.openxmlformats.org/presentationml/2006/main">
+  <p:cSld>
+    <p:spTree>
+      <p:nvGrpSpPr>
+        <p:cNvPr id="1" name=""/>
+        <p:cNvGrpSpPr/>
+        <p:nvPr/>
+      </p:nvGrpSpPr>
+      <p:grpSpPr>
+        <a:xfrm>
+          <a:off x="0" y="0"/>
+          <a:ext cx="0" cy="0"/>
+          <a:chOff x="0" y="0"/>
+          <a:chExt cx="0" cy="0"/>
+        </a:xfrm>
+      </p:grpSpPr>
+      <p:sp>
+        <p:nvSpPr>
+          <p:cNvPr id="2" name="Title 1"/>
+          <p:cNvSpPr>
+            <a:spLocks noGrp="1"/>
+          </p:cNvSpPr>
+          <p:nvPr>
+            <p:ph type="title"/>
+          </p:nvPr>
+        </p:nvSpPr>
+        <p:spPr>
+          <a:xfrm>
+            <a:off x="480291" y="599301"/>
+            <a:ext cx="9523821" cy="1616550"/>
+          </a:xfrm>
+        </p:spPr>
+        <p:txBody>
+          <a:bodyPr/>
+          <a:lstStyle/>
+          <a:p>
+            <a:r>
+              <a:rPr lang="en-US" dirty="0" smtClean="0"/>
+              <a:t>02: </a:t>
+            </a:r>
+            <a:r>
+              <a:rPr lang="en-US" b="1" i="1" dirty="0"/>
+              <a:t>Seek remote internships / jobs for students fresh from school</a:t>
+            </a:r>
+            <a:br>
+              <a:rPr lang="en-US" b="1" i="1" dirty="0"/>
+            </a:br>
+            <a:endParaRPr lang="en-US" dirty="0"/>
+          </a:p>
+        </p:txBody>
+      </p:sp>
+      <p:sp>
+        <p:nvSpPr>
+          <p:cNvPr id="3" name="Content Placeholder 2"/>
+          <p:cNvSpPr>
+            <a:spLocks noGrp="1"/>
+          </p:cNvSpPr>
+          <p:nvPr>
+            <p:ph idx="1"/>
+          </p:nvPr>
+        </p:nvSpPr>
+        <p:spPr>
+          <a:xfrm>
+            <a:off x="766618" y="2262909"/>
+            <a:ext cx="10538691" cy="4036291"/>
+          </a:xfrm>
+        </p:spPr>
+        <p:txBody>
+          <a:bodyPr/>
+          <a:lstStyle/>
+          <a:p>
+            <a:pPr marL="914400" lvl="2" indent="0">
+              <a:buNone/>
+            </a:pPr>
+            <a:endParaRPr lang="en-US" dirty="0" smtClean="0"/>
+          </a:p>
+          <a:p>
+            <a:endParaRPr lang="en-US" dirty="0"/>
+          </a:p>
+        </p:txBody>
+      </p:sp>
+      <p:pic>
+        <p:nvPicPr>
+          <p:cNvPr id="4" name="Picture 3"/>
+          <p:cNvPicPr>
+            <a:picLocks noChangeAspect="1"/>
+          </p:cNvPicPr>
+          <p:nvPr/>
+        </p:nvPicPr>
+        <p:blipFill>
+          <a:blip r:embed="rId2">
+            <a:extLst>
+              <a:ext uri="{28A0092B-C50C-407E-A947-70E740481C1C}">
+                <a14:useLocalDpi xmlns:a14="http://schemas.microsoft.com/office/drawing/2010/main" val="0"/>
+              </a:ext>
+            </a:extLst>
+          </a:blip>
+          <a:stretch>
+            <a:fillRect/>
+          </a:stretch>
+        </p:blipFill>
+        <p:spPr>
+          <a:xfrm>
+            <a:off x="11019559" y="5611668"/>
+            <a:ext cx="1098550" cy="1098550"/>
+          </a:xfrm>
+          <a:prstGeom prst="rect">
+            <a:avLst/>
+          </a:prstGeom>
+        </p:spPr>
+      </p:pic>
+      <p:sp>
+        <p:nvSpPr>
+          <p:cNvPr id="5" name="Content Placeholder 8"/>
+          <p:cNvSpPr txBox="1">
+            <a:spLocks/>
+          </p:cNvSpPr>
+          <p:nvPr/>
+        </p:nvSpPr>
+        <p:spPr>
+          <a:xfrm>
+            <a:off x="979463" y="2364508"/>
+            <a:ext cx="8825659" cy="384175"/>
+          </a:xfrm>
+          <a:prstGeom prst="rect">
+            <a:avLst/>
+          </a:prstGeom>
+        </p:spPr>
+        <p:txBody>
+          <a:bodyPr vert="horz" lIns="91440" tIns="45720" rIns="91440" bIns="45720" rtlCol="0">
+            <a:normAutofit/>
+          </a:bodyPr>
+          <a:lstStyle>
+            <a:lvl1pPr marL="342900" indent="-342900" algn="l" defTabSz="457200" rtl="0" eaLnBrk="1" latinLnBrk="0" hangingPunct="1">
+              <a:spcBef>
+                <a:spcPts val="1000"/>
+              </a:spcBef>
+              <a:spcAft>
+                <a:spcPts val="0"/>
+              </a:spcAft>
+              <a:buClr>
+                <a:schemeClr val="accent1"/>
+              </a:buClr>
+              <a:buSzPct val="80000"/>
+              <a:buFont typeface="Wingdings 3" charset="2"/>
+              <a:buChar char=""/>
+              <a:defRPr sz="1800" b="0" i="0" kern="1200">
+                <a:solidFill>
+                  <a:schemeClr val="tx1">
+                    <a:lumMod val="75000"/>
+                    <a:lumOff val="25000"/>
+                  </a:schemeClr>
+                </a:solidFill>
+                <a:latin typeface="+mn-lt"/>
+                <a:ea typeface="+mn-ea"/>
+                <a:cs typeface="+mn-cs"/>
+              </a:defRPr>
+            </a:lvl1pPr>
+            <a:lvl2pPr marL="742950" indent="-285750" algn="l" defTabSz="457200" rtl="0" eaLnBrk="1" latinLnBrk="0" hangingPunct="1">
+              <a:spcBef>
+                <a:spcPts val="1000"/>
+              </a:spcBef>
+              <a:spcAft>
+                <a:spcPts val="0"/>
+              </a:spcAft>
+              <a:buClr>
+                <a:schemeClr val="accent1"/>
+              </a:buClr>
+              <a:buSzPct val="80000"/>
+              <a:buFont typeface="Wingdings 3" charset="2"/>
+              <a:buChar char=""/>
+              <a:defRPr sz="1600" b="0" i="0" kern="1200">
+                <a:solidFill>
+                  <a:schemeClr val="tx1">
+                    <a:lumMod val="75000"/>
+                    <a:lumOff val="25000"/>
+                  </a:schemeClr>
+                </a:solidFill>
+                <a:latin typeface="+mn-lt"/>
+                <a:ea typeface="+mn-ea"/>
+                <a:cs typeface="+mn-cs"/>
+              </a:defRPr>
+            </a:lvl2pPr>
+            <a:lvl3pPr marL="1143000" indent="-228600" algn="l" defTabSz="457200" rtl="0" eaLnBrk="1" latinLnBrk="0" hangingPunct="1">
+              <a:spcBef>
+                <a:spcPts val="1000"/>
+              </a:spcBef>
+              <a:spcAft>
+                <a:spcPts val="0"/>
+              </a:spcAft>
+              <a:buClr>
+                <a:schemeClr val="accent1"/>
+              </a:buClr>
+              <a:buSzPct val="80000"/>
+              <a:buFont typeface="Wingdings 3" charset="2"/>
+              <a:buChar char=""/>
+              <a:defRPr sz="1400" b="0" i="0" kern="1200">
+                <a:solidFill>
+                  <a:schemeClr val="tx1">
+                    <a:lumMod val="75000"/>
+                    <a:lumOff val="25000"/>
+                  </a:schemeClr>
+                </a:solidFill>
+                <a:latin typeface="+mn-lt"/>
+                <a:ea typeface="+mn-ea"/>
+                <a:cs typeface="+mn-cs"/>
+              </a:defRPr>
+            </a:lvl3pPr>
+            <a:lvl4pPr marL="1600200" indent="-228600" algn="l" defTabSz="457200" rtl="0" eaLnBrk="1" latinLnBrk="0" hangingPunct="1">
+              <a:spcBef>
+                <a:spcPts val="1000"/>
+              </a:spcBef>
+              <a:spcAft>
+                <a:spcPts val="0"/>
+              </a:spcAft>
+              <a:buClr>
+                <a:schemeClr val="accent1"/>
+              </a:buClr>
+              <a:buSzPct val="80000"/>
+              <a:buFont typeface="Wingdings 3" charset="2"/>
+              <a:buChar char=""/>
+              <a:defRPr sz="1200" b="0" i="0" kern="1200">
+                <a:solidFill>
+                  <a:schemeClr val="tx1">
+                    <a:lumMod val="75000"/>
+                    <a:lumOff val="25000"/>
+                  </a:schemeClr>
+                </a:solidFill>
+                <a:latin typeface="+mn-lt"/>
+                <a:ea typeface="+mn-ea"/>
+                <a:cs typeface="+mn-cs"/>
+              </a:defRPr>
+            </a:lvl4pPr>
+            <a:lvl5pPr marL="2057400" indent="-228600" algn="l" defTabSz="457200" rtl="0" eaLnBrk="1" latinLnBrk="0" hangingPunct="1">
+              <a:spcBef>
+                <a:spcPts val="1000"/>
+              </a:spcBef>
+              <a:spcAft>
+                <a:spcPts val="0"/>
+              </a:spcAft>
+              <a:buClr>
+                <a:schemeClr val="accent1"/>
+              </a:buClr>
+              <a:buSzPct val="80000"/>
+              <a:buFont typeface="Wingdings 3" charset="2"/>
+              <a:buChar char=""/>
+              <a:defRPr sz="1200" b="0" i="0" kern="1200">
+                <a:solidFill>
+                  <a:schemeClr val="tx1">
+                    <a:lumMod val="75000"/>
+                    <a:lumOff val="25000"/>
+                  </a:schemeClr>
+                </a:solidFill>
+                <a:latin typeface="+mn-lt"/>
+                <a:ea typeface="+mn-ea"/>
+                <a:cs typeface="+mn-cs"/>
+              </a:defRPr>
+            </a:lvl5pPr>
+            <a:lvl6pPr marL="2514600" indent="-228600" algn="l" defTabSz="457200" rtl="0" eaLnBrk="1" latinLnBrk="0" hangingPunct="1">
+              <a:spcBef>
+                <a:spcPts val="1000"/>
+              </a:spcBef>
+              <a:spcAft>
+                <a:spcPts val="0"/>
+              </a:spcAft>
+              <a:buClr>
+                <a:schemeClr val="accent1"/>
+              </a:buClr>
+              <a:buSzPct val="80000"/>
+              <a:buFont typeface="Wingdings 3" charset="2"/>
+              <a:buChar char=""/>
+              <a:defRPr sz="1200" b="0" i="0" kern="1200">
+                <a:solidFill>
+                  <a:schemeClr val="tx1">
+                    <a:lumMod val="75000"/>
+                    <a:lumOff val="25000"/>
+                  </a:schemeClr>
+                </a:solidFill>
+                <a:latin typeface="+mn-lt"/>
+                <a:ea typeface="+mn-ea"/>
+                <a:cs typeface="+mn-cs"/>
+              </a:defRPr>
+            </a:lvl6pPr>
+            <a:lvl7pPr marL="2971800" indent="-228600" algn="l" defTabSz="457200" rtl="0" eaLnBrk="1" latinLnBrk="0" hangingPunct="1">
+              <a:spcBef>
+                <a:spcPts val="1000"/>
+              </a:spcBef>
+              <a:spcAft>
+                <a:spcPts val="0"/>
+              </a:spcAft>
+              <a:buClr>
+                <a:schemeClr val="accent1"/>
+              </a:buClr>
+              <a:buSzPct val="80000"/>
+              <a:buFont typeface="Wingdings 3" charset="2"/>
+              <a:buChar char=""/>
+              <a:defRPr sz="1200" b="0" i="0" kern="1200">
+                <a:solidFill>
+                  <a:schemeClr val="tx1">
+                    <a:lumMod val="75000"/>
+                    <a:lumOff val="25000"/>
+                  </a:schemeClr>
+                </a:solidFill>
+                <a:latin typeface="+mn-lt"/>
+                <a:ea typeface="+mn-ea"/>
+                <a:cs typeface="+mn-cs"/>
+              </a:defRPr>
+            </a:lvl7pPr>
+            <a:lvl8pPr marL="3429000" indent="-228600" algn="l" defTabSz="457200" rtl="0" eaLnBrk="1" latinLnBrk="0" hangingPunct="1">
+              <a:spcBef>
+                <a:spcPts val="1000"/>
+              </a:spcBef>
+              <a:spcAft>
+                <a:spcPts val="0"/>
+              </a:spcAft>
+              <a:buClr>
+                <a:schemeClr val="accent1"/>
+              </a:buClr>
+              <a:buSzPct val="80000"/>
+              <a:buFont typeface="Wingdings 3" charset="2"/>
+              <a:buChar char=""/>
+              <a:defRPr sz="1200" b="0" i="0" kern="1200">
+                <a:solidFill>
+                  <a:schemeClr val="tx1">
+                    <a:lumMod val="75000"/>
+                    <a:lumOff val="25000"/>
+                  </a:schemeClr>
+                </a:solidFill>
+                <a:latin typeface="+mn-lt"/>
+                <a:ea typeface="+mn-ea"/>
+                <a:cs typeface="+mn-cs"/>
+              </a:defRPr>
+            </a:lvl8pPr>
+            <a:lvl9pPr marL="3886200" indent="-228600" algn="l" defTabSz="457200" rtl="0" eaLnBrk="1" latinLnBrk="0" hangingPunct="1">
+              <a:spcBef>
+                <a:spcPts val="1000"/>
+              </a:spcBef>
+              <a:spcAft>
+                <a:spcPts val="0"/>
+              </a:spcAft>
+              <a:buClr>
+                <a:schemeClr val="accent1"/>
+              </a:buClr>
+              <a:buSzPct val="80000"/>
+              <a:buFont typeface="Wingdings 3" charset="2"/>
+              <a:buChar char=""/>
+              <a:defRPr sz="1200" b="0" i="0" kern="1200">
+                <a:solidFill>
+                  <a:schemeClr val="tx1">
+                    <a:lumMod val="75000"/>
+                    <a:lumOff val="25000"/>
+                  </a:schemeClr>
+                </a:solidFill>
+                <a:latin typeface="+mn-lt"/>
+                <a:ea typeface="+mn-ea"/>
+                <a:cs typeface="+mn-cs"/>
+              </a:defRPr>
+            </a:lvl9pPr>
+          </a:lstStyle>
+          <a:p>
+            <a:endParaRPr lang="en-US" dirty="0"/>
+          </a:p>
+        </p:txBody>
+      </p:sp>
+      <p:pic>
+        <p:nvPicPr>
+          <p:cNvPr id="6" name="Picture 5"/>
+          <p:cNvPicPr>
+            <a:picLocks noChangeAspect="1"/>
+          </p:cNvPicPr>
+          <p:nvPr/>
+        </p:nvPicPr>
+        <p:blipFill>
+          <a:blip r:embed="rId3">
+            <a:extLst>
+              <a:ext uri="{28A0092B-C50C-407E-A947-70E740481C1C}">
+                <a14:useLocalDpi xmlns:a14="http://schemas.microsoft.com/office/drawing/2010/main" val="0"/>
+              </a:ext>
+            </a:extLst>
+          </a:blip>
+          <a:stretch>
+            <a:fillRect/>
+          </a:stretch>
+        </p:blipFill>
+        <p:spPr>
+          <a:xfrm>
+            <a:off x="481415" y="2370090"/>
+            <a:ext cx="5427951" cy="3821928"/>
+          </a:xfrm>
+          <a:prstGeom prst="rect">
+            <a:avLst/>
+          </a:prstGeom>
+        </p:spPr>
+      </p:pic>
+      <p:sp>
+        <p:nvSpPr>
+          <p:cNvPr id="8" name="Content Placeholder 7"/>
+          <p:cNvSpPr txBox="1">
+            <a:spLocks/>
+          </p:cNvSpPr>
+          <p:nvPr/>
+        </p:nvSpPr>
+        <p:spPr>
+          <a:xfrm>
+            <a:off x="6015789" y="2888291"/>
+            <a:ext cx="4803007" cy="3262252"/>
+          </a:xfrm>
+          <a:prstGeom prst="rect">
+            <a:avLst/>
+          </a:prstGeom>
+        </p:spPr>
+        <p:txBody>
+          <a:bodyPr vert="horz" lIns="91440" tIns="45720" rIns="91440" bIns="45720" rtlCol="0">
+            <a:normAutofit/>
+          </a:bodyPr>
+          <a:lstStyle>
+            <a:lvl1pPr marL="342900" indent="-342900" algn="l" defTabSz="457200" rtl="0" eaLnBrk="1" latinLnBrk="0" hangingPunct="1">
+              <a:spcBef>
+                <a:spcPts val="1000"/>
+              </a:spcBef>
+              <a:spcAft>
+                <a:spcPts val="0"/>
+              </a:spcAft>
+              <a:buClr>
+                <a:schemeClr val="accent1"/>
+              </a:buClr>
+              <a:buSzPct val="80000"/>
+              <a:buFont typeface="Wingdings 3" charset="2"/>
+              <a:buChar char=""/>
+              <a:defRPr sz="1800" b="0" i="0" kern="1200">
+                <a:solidFill>
+                  <a:schemeClr val="tx1">
+                    <a:lumMod val="75000"/>
+                    <a:lumOff val="25000"/>
+                  </a:schemeClr>
+                </a:solidFill>
+                <a:latin typeface="+mn-lt"/>
+                <a:ea typeface="+mn-ea"/>
+                <a:cs typeface="+mn-cs"/>
+              </a:defRPr>
+            </a:lvl1pPr>
+            <a:lvl2pPr marL="742950" indent="-285750" algn="l" defTabSz="457200" rtl="0" eaLnBrk="1" latinLnBrk="0" hangingPunct="1">
+              <a:spcBef>
+                <a:spcPts val="1000"/>
+              </a:spcBef>
+              <a:spcAft>
+                <a:spcPts val="0"/>
+              </a:spcAft>
+              <a:buClr>
+                <a:schemeClr val="accent1"/>
+              </a:buClr>
+              <a:buSzPct val="80000"/>
+              <a:buFont typeface="Wingdings 3" charset="2"/>
+              <a:buChar char=""/>
+              <a:defRPr sz="1600" b="0" i="0" kern="1200">
+                <a:solidFill>
+                  <a:schemeClr val="tx1">
+                    <a:lumMod val="75000"/>
+                    <a:lumOff val="25000"/>
+                  </a:schemeClr>
+                </a:solidFill>
+                <a:latin typeface="+mn-lt"/>
+                <a:ea typeface="+mn-ea"/>
+                <a:cs typeface="+mn-cs"/>
+              </a:defRPr>
+            </a:lvl2pPr>
+            <a:lvl3pPr marL="1143000" indent="-228600" algn="l" defTabSz="457200" rtl="0" eaLnBrk="1" latinLnBrk="0" hangingPunct="1">
+              <a:spcBef>
+                <a:spcPts val="1000"/>
+              </a:spcBef>
+              <a:spcAft>
+                <a:spcPts val="0"/>
+              </a:spcAft>
+              <a:buClr>
+                <a:schemeClr val="accent1"/>
+              </a:buClr>
+              <a:buSzPct val="80000"/>
+              <a:buFont typeface="Wingdings 3" charset="2"/>
+              <a:buChar char=""/>
+              <a:defRPr sz="1400" b="0" i="0" kern="1200">
+                <a:solidFill>
+                  <a:schemeClr val="tx1">
+                    <a:lumMod val="75000"/>
+                    <a:lumOff val="25000"/>
+                  </a:schemeClr>
+                </a:solidFill>
+                <a:latin typeface="+mn-lt"/>
+                <a:ea typeface="+mn-ea"/>
+                <a:cs typeface="+mn-cs"/>
+              </a:defRPr>
+            </a:lvl3pPr>
+            <a:lvl4pPr marL="1600200" indent="-228600" algn="l" defTabSz="457200" rtl="0" eaLnBrk="1" latinLnBrk="0" hangingPunct="1">
+              <a:spcBef>
+                <a:spcPts val="1000"/>
+              </a:spcBef>
+              <a:spcAft>
+                <a:spcPts val="0"/>
+              </a:spcAft>
+              <a:buClr>
+                <a:schemeClr val="accent1"/>
+              </a:buClr>
+              <a:buSzPct val="80000"/>
+              <a:buFont typeface="Wingdings 3" charset="2"/>
+              <a:buChar char=""/>
+              <a:defRPr sz="1200" b="0" i="0" kern="1200">
+                <a:solidFill>
+                  <a:schemeClr val="tx1">
+                    <a:lumMod val="75000"/>
+                    <a:lumOff val="25000"/>
+                  </a:schemeClr>
+                </a:solidFill>
+                <a:latin typeface="+mn-lt"/>
+                <a:ea typeface="+mn-ea"/>
+                <a:cs typeface="+mn-cs"/>
+              </a:defRPr>
+            </a:lvl4pPr>
+            <a:lvl5pPr marL="2057400" indent="-228600" algn="l" defTabSz="457200" rtl="0" eaLnBrk="1" latinLnBrk="0" hangingPunct="1">
+              <a:spcBef>
+                <a:spcPts val="1000"/>
+              </a:spcBef>
+              <a:spcAft>
+                <a:spcPts val="0"/>
+              </a:spcAft>
+              <a:buClr>
+                <a:schemeClr val="accent1"/>
+              </a:buClr>
+              <a:buSzPct val="80000"/>
+              <a:buFont typeface="Wingdings 3" charset="2"/>
+              <a:buChar char=""/>
+              <a:defRPr sz="1200" b="0" i="0" kern="1200">
+                <a:solidFill>
+                  <a:schemeClr val="tx1">
+                    <a:lumMod val="75000"/>
+                    <a:lumOff val="25000"/>
+                  </a:schemeClr>
+                </a:solidFill>
+                <a:latin typeface="+mn-lt"/>
+                <a:ea typeface="+mn-ea"/>
+                <a:cs typeface="+mn-cs"/>
+              </a:defRPr>
+            </a:lvl5pPr>
+            <a:lvl6pPr marL="2514600" indent="-228600" algn="l" defTabSz="457200" rtl="0" eaLnBrk="1" latinLnBrk="0" hangingPunct="1">
+              <a:spcBef>
+                <a:spcPts val="1000"/>
+              </a:spcBef>
+              <a:spcAft>
+                <a:spcPts val="0"/>
+              </a:spcAft>
+              <a:buClr>
+                <a:schemeClr val="accent1"/>
+              </a:buClr>
+              <a:buSzPct val="80000"/>
+              <a:buFont typeface="Wingdings 3" charset="2"/>
+              <a:buChar char=""/>
+              <a:defRPr sz="1200" b="0" i="0" kern="1200">
+                <a:solidFill>
+                  <a:schemeClr val="tx1">
+                    <a:lumMod val="75000"/>
+                    <a:lumOff val="25000"/>
+                  </a:schemeClr>
+                </a:solidFill>
+                <a:latin typeface="+mn-lt"/>
+                <a:ea typeface="+mn-ea"/>
+                <a:cs typeface="+mn-cs"/>
+              </a:defRPr>
+            </a:lvl6pPr>
+            <a:lvl7pPr marL="2971800" indent="-228600" algn="l" defTabSz="457200" rtl="0" eaLnBrk="1" latinLnBrk="0" hangingPunct="1">
+              <a:spcBef>
+                <a:spcPts val="1000"/>
+              </a:spcBef>
+              <a:spcAft>
+                <a:spcPts val="0"/>
+              </a:spcAft>
+              <a:buClr>
+                <a:schemeClr val="accent1"/>
+              </a:buClr>
+              <a:buSzPct val="80000"/>
+              <a:buFont typeface="Wingdings 3" charset="2"/>
+              <a:buChar char=""/>
+              <a:defRPr sz="1200" b="0" i="0" kern="1200">
+                <a:solidFill>
+                  <a:schemeClr val="tx1">
+                    <a:lumMod val="75000"/>
+                    <a:lumOff val="25000"/>
+                  </a:schemeClr>
+                </a:solidFill>
+                <a:latin typeface="+mn-lt"/>
+                <a:ea typeface="+mn-ea"/>
+                <a:cs typeface="+mn-cs"/>
+              </a:defRPr>
+            </a:lvl7pPr>
+            <a:lvl8pPr marL="3429000" indent="-228600" algn="l" defTabSz="457200" rtl="0" eaLnBrk="1" latinLnBrk="0" hangingPunct="1">
+              <a:spcBef>
+                <a:spcPts val="1000"/>
+              </a:spcBef>
+              <a:spcAft>
+                <a:spcPts val="0"/>
+              </a:spcAft>
+              <a:buClr>
+                <a:schemeClr val="accent1"/>
+              </a:buClr>
+              <a:buSzPct val="80000"/>
+              <a:buFont typeface="Wingdings 3" charset="2"/>
+              <a:buChar char=""/>
+              <a:defRPr sz="1200" b="0" i="0" kern="1200">
+                <a:solidFill>
+                  <a:schemeClr val="tx1">
+                    <a:lumMod val="75000"/>
+                    <a:lumOff val="25000"/>
+                  </a:schemeClr>
+                </a:solidFill>
+                <a:latin typeface="+mn-lt"/>
+                <a:ea typeface="+mn-ea"/>
+                <a:cs typeface="+mn-cs"/>
+              </a:defRPr>
+            </a:lvl8pPr>
+            <a:lvl9pPr marL="3886200" indent="-228600" algn="l" defTabSz="457200" rtl="0" eaLnBrk="1" latinLnBrk="0" hangingPunct="1">
+              <a:spcBef>
+                <a:spcPts val="1000"/>
+              </a:spcBef>
+              <a:spcAft>
+                <a:spcPts val="0"/>
+              </a:spcAft>
+              <a:buClr>
+                <a:schemeClr val="accent1"/>
+              </a:buClr>
+              <a:buSzPct val="80000"/>
+              <a:buFont typeface="Wingdings 3" charset="2"/>
+              <a:buChar char=""/>
+              <a:defRPr sz="1200" b="0" i="0" kern="1200">
+                <a:solidFill>
+                  <a:schemeClr val="tx1">
+                    <a:lumMod val="75000"/>
+                    <a:lumOff val="25000"/>
+                  </a:schemeClr>
+                </a:solidFill>
+                <a:latin typeface="+mn-lt"/>
+                <a:ea typeface="+mn-ea"/>
+                <a:cs typeface="+mn-cs"/>
+              </a:defRPr>
+            </a:lvl9pPr>
+          </a:lstStyle>
+          <a:p>
+            <a:endParaRPr lang="en-US" dirty="0" smtClean="0"/>
+          </a:p>
+        </p:txBody>
+      </p:sp>
+    </p:spTree>
+    <p:extLst>
+      <p:ext uri="{BB962C8B-B14F-4D97-AF65-F5344CB8AC3E}">
+        <p14:creationId xmlns:p14="http://schemas.microsoft.com/office/powerpoint/2010/main" val="3996535338"/>
+      </p:ext>
+    </p:extLst>
+  </p:cSld>
+  <p:clrMapOvr>
+    <a:masterClrMapping/>
+  </p:clrMapOvr>
+  <p:timing>
+    <p:tnLst>
+      <p:par>
+        <p:cTn id="1" dur="indefinite" restart="never" nodeType="tmRoot"/>
+      </p:par>
+    </p:tnLst>
+  </p:timing>
+</p:sld>
+</file>
+
+<file path=ppt/slides/slide8.xml><?xml version="1.0" encoding="utf-8"?>
+<p:sld xmlns:a="http://schemas.openxmlformats.org/drawingml/2006/main" xmlns:r="http://schemas.openxmlformats.org/officeDocument/2006/relationships" xmlns:p="http://schemas.openxmlformats.org/presentationml/2006/main">
+  <p:cSld>
+    <p:spTree>
+      <p:nvGrpSpPr>
+        <p:cNvPr id="1" name=""/>
+        <p:cNvGrpSpPr/>
+        <p:nvPr/>
+      </p:nvGrpSpPr>
+      <p:grpSpPr>
+        <a:xfrm>
+          <a:off x="0" y="0"/>
+          <a:ext cx="0" cy="0"/>
+          <a:chOff x="0" y="0"/>
+          <a:chExt cx="0" cy="0"/>
+        </a:xfrm>
+      </p:grpSpPr>
+      <p:sp>
+        <p:nvSpPr>
+          <p:cNvPr id="2" name="Title 1"/>
+          <p:cNvSpPr>
+            <a:spLocks noGrp="1"/>
+          </p:cNvSpPr>
+          <p:nvPr>
+            <p:ph type="title"/>
+          </p:nvPr>
+        </p:nvSpPr>
+        <p:spPr>
+          <a:xfrm>
+            <a:off x="471055" y="489528"/>
+            <a:ext cx="11249890" cy="1320800"/>
+          </a:xfrm>
+        </p:spPr>
+        <p:txBody>
+          <a:bodyPr/>
+          <a:lstStyle/>
+          <a:p>
+            <a:r>
+              <a:rPr lang="en-US" dirty="0" smtClean="0"/>
+              <a:t>03: </a:t>
+            </a:r>
+            <a:r>
+              <a:rPr lang="en-US" b="1" i="1" dirty="0"/>
+              <a:t>Spring up as many Africa R User Groups</a:t>
+            </a:r>
+            <a:br>
+              <a:rPr lang="en-US" b="1" i="1" dirty="0"/>
+            </a:br>
+            <a:endParaRPr lang="en-US" dirty="0"/>
+          </a:p>
+        </p:txBody>
+      </p:sp>
+      <p:pic>
+        <p:nvPicPr>
+          <p:cNvPr id="4" name="Picture 3"/>
+          <p:cNvPicPr>
+            <a:picLocks noChangeAspect="1"/>
+          </p:cNvPicPr>
+          <p:nvPr/>
+        </p:nvPicPr>
+        <p:blipFill>
+          <a:blip r:embed="rId2">
+            <a:extLst>
+              <a:ext uri="{28A0092B-C50C-407E-A947-70E740481C1C}">
+                <a14:useLocalDpi xmlns:a14="http://schemas.microsoft.com/office/drawing/2010/main" val="0"/>
+              </a:ext>
+            </a:extLst>
+          </a:blip>
+          <a:stretch>
+            <a:fillRect/>
+          </a:stretch>
+        </p:blipFill>
+        <p:spPr>
+          <a:xfrm>
+            <a:off x="11093450" y="5749925"/>
+            <a:ext cx="1098550" cy="1098550"/>
+          </a:xfrm>
+          <a:prstGeom prst="rect">
+            <a:avLst/>
+          </a:prstGeom>
+        </p:spPr>
+      </p:pic>
+      <p:sp>
+        <p:nvSpPr>
+          <p:cNvPr id="6" name="Content Placeholder 8"/>
+          <p:cNvSpPr txBox="1">
+            <a:spLocks/>
+          </p:cNvSpPr>
+          <p:nvPr/>
+        </p:nvSpPr>
+        <p:spPr>
+          <a:xfrm>
+            <a:off x="979463" y="2364508"/>
+            <a:ext cx="8825659" cy="384175"/>
+          </a:xfrm>
+          <a:prstGeom prst="rect">
+            <a:avLst/>
+          </a:prstGeom>
+        </p:spPr>
+        <p:txBody>
+          <a:bodyPr vert="horz" lIns="91440" tIns="45720" rIns="91440" bIns="45720" rtlCol="0">
+            <a:normAutofit/>
+          </a:bodyPr>
+          <a:lstStyle>
+            <a:lvl1pPr marL="342900" indent="-342900" algn="l" defTabSz="457200" rtl="0" eaLnBrk="1" latinLnBrk="0" hangingPunct="1">
+              <a:spcBef>
+                <a:spcPts val="1000"/>
+              </a:spcBef>
+              <a:spcAft>
+                <a:spcPts val="0"/>
+              </a:spcAft>
+              <a:buClr>
+                <a:schemeClr val="accent1"/>
+              </a:buClr>
+              <a:buSzPct val="80000"/>
+              <a:buFont typeface="Wingdings 3" charset="2"/>
+              <a:buChar char=""/>
+              <a:defRPr sz="1800" b="0" i="0" kern="1200">
+                <a:solidFill>
+                  <a:schemeClr val="tx1">
+                    <a:lumMod val="75000"/>
+                    <a:lumOff val="25000"/>
+                  </a:schemeClr>
+                </a:solidFill>
+                <a:latin typeface="+mn-lt"/>
+                <a:ea typeface="+mn-ea"/>
+                <a:cs typeface="+mn-cs"/>
+              </a:defRPr>
+            </a:lvl1pPr>
+            <a:lvl2pPr marL="742950" indent="-285750" algn="l" defTabSz="457200" rtl="0" eaLnBrk="1" latinLnBrk="0" hangingPunct="1">
+              <a:spcBef>
+                <a:spcPts val="1000"/>
+              </a:spcBef>
+              <a:spcAft>
+                <a:spcPts val="0"/>
+              </a:spcAft>
+              <a:buClr>
+                <a:schemeClr val="accent1"/>
+              </a:buClr>
+              <a:buSzPct val="80000"/>
+              <a:buFont typeface="Wingdings 3" charset="2"/>
+              <a:buChar char=""/>
+              <a:defRPr sz="1600" b="0" i="0" kern="1200">
+                <a:solidFill>
+                  <a:schemeClr val="tx1">
+                    <a:lumMod val="75000"/>
+                    <a:lumOff val="25000"/>
+                  </a:schemeClr>
+                </a:solidFill>
+                <a:latin typeface="+mn-lt"/>
+                <a:ea typeface="+mn-ea"/>
+                <a:cs typeface="+mn-cs"/>
+              </a:defRPr>
+            </a:lvl2pPr>
+            <a:lvl3pPr marL="1143000" indent="-228600" algn="l" defTabSz="457200" rtl="0" eaLnBrk="1" latinLnBrk="0" hangingPunct="1">
+              <a:spcBef>
+                <a:spcPts val="1000"/>
+              </a:spcBef>
+              <a:spcAft>
+                <a:spcPts val="0"/>
+              </a:spcAft>
+              <a:buClr>
+                <a:schemeClr val="accent1"/>
+              </a:buClr>
+              <a:buSzPct val="80000"/>
+              <a:buFont typeface="Wingdings 3" charset="2"/>
+              <a:buChar char=""/>
+              <a:defRPr sz="1400" b="0" i="0" kern="1200">
+                <a:solidFill>
+                  <a:schemeClr val="tx1">
+                    <a:lumMod val="75000"/>
+                    <a:lumOff val="25000"/>
+                  </a:schemeClr>
+                </a:solidFill>
+                <a:latin typeface="+mn-lt"/>
+                <a:ea typeface="+mn-ea"/>
+                <a:cs typeface="+mn-cs"/>
+              </a:defRPr>
+            </a:lvl3pPr>
+            <a:lvl4pPr marL="1600200" indent="-228600" algn="l" defTabSz="457200" rtl="0" eaLnBrk="1" latinLnBrk="0" hangingPunct="1">
+              <a:spcBef>
+                <a:spcPts val="1000"/>
+              </a:spcBef>
+              <a:spcAft>
+                <a:spcPts val="0"/>
+              </a:spcAft>
+              <a:buClr>
+                <a:schemeClr val="accent1"/>
+              </a:buClr>
+              <a:buSzPct val="80000"/>
+              <a:buFont typeface="Wingdings 3" charset="2"/>
+              <a:buChar char=""/>
+              <a:defRPr sz="1200" b="0" i="0" kern="1200">
+                <a:solidFill>
+                  <a:schemeClr val="tx1">
+                    <a:lumMod val="75000"/>
+                    <a:lumOff val="25000"/>
+                  </a:schemeClr>
+                </a:solidFill>
+                <a:latin typeface="+mn-lt"/>
+                <a:ea typeface="+mn-ea"/>
+                <a:cs typeface="+mn-cs"/>
+              </a:defRPr>
+            </a:lvl4pPr>
+            <a:lvl5pPr marL="2057400" indent="-228600" algn="l" defTabSz="457200" rtl="0" eaLnBrk="1" latinLnBrk="0" hangingPunct="1">
+              <a:spcBef>
+                <a:spcPts val="1000"/>
+              </a:spcBef>
+              <a:spcAft>
+                <a:spcPts val="0"/>
+              </a:spcAft>
+              <a:buClr>
+                <a:schemeClr val="accent1"/>
+              </a:buClr>
+              <a:buSzPct val="80000"/>
+              <a:buFont typeface="Wingdings 3" charset="2"/>
+              <a:buChar char=""/>
+              <a:defRPr sz="1200" b="0" i="0" kern="1200">
+                <a:solidFill>
+                  <a:schemeClr val="tx1">
+                    <a:lumMod val="75000"/>
+                    <a:lumOff val="25000"/>
+                  </a:schemeClr>
+                </a:solidFill>
+                <a:latin typeface="+mn-lt"/>
+                <a:ea typeface="+mn-ea"/>
+                <a:cs typeface="+mn-cs"/>
+              </a:defRPr>
+            </a:lvl5pPr>
+            <a:lvl6pPr marL="2514600" indent="-228600" algn="l" defTabSz="457200" rtl="0" eaLnBrk="1" latinLnBrk="0" hangingPunct="1">
+              <a:spcBef>
+                <a:spcPts val="1000"/>
+              </a:spcBef>
+              <a:spcAft>
+                <a:spcPts val="0"/>
+              </a:spcAft>
+              <a:buClr>
+                <a:schemeClr val="accent1"/>
+              </a:buClr>
+              <a:buSzPct val="80000"/>
+              <a:buFont typeface="Wingdings 3" charset="2"/>
+              <a:buChar char=""/>
+              <a:defRPr sz="1200" b="0" i="0" kern="1200">
+                <a:solidFill>
+                  <a:schemeClr val="tx1">
+                    <a:lumMod val="75000"/>
+                    <a:lumOff val="25000"/>
+                  </a:schemeClr>
+                </a:solidFill>
+                <a:latin typeface="+mn-lt"/>
+                <a:ea typeface="+mn-ea"/>
+                <a:cs typeface="+mn-cs"/>
+              </a:defRPr>
+            </a:lvl6pPr>
+            <a:lvl7pPr marL="2971800" indent="-228600" algn="l" defTabSz="457200" rtl="0" eaLnBrk="1" latinLnBrk="0" hangingPunct="1">
+              <a:spcBef>
+                <a:spcPts val="1000"/>
+              </a:spcBef>
+              <a:spcAft>
+                <a:spcPts val="0"/>
+              </a:spcAft>
+              <a:buClr>
+                <a:schemeClr val="accent1"/>
+              </a:buClr>
+              <a:buSzPct val="80000"/>
+              <a:buFont typeface="Wingdings 3" charset="2"/>
+              <a:buChar char=""/>
+              <a:defRPr sz="1200" b="0" i="0" kern="1200">
+                <a:solidFill>
+                  <a:schemeClr val="tx1">
+                    <a:lumMod val="75000"/>
+                    <a:lumOff val="25000"/>
+                  </a:schemeClr>
+                </a:solidFill>
+                <a:latin typeface="+mn-lt"/>
+                <a:ea typeface="+mn-ea"/>
+                <a:cs typeface="+mn-cs"/>
+              </a:defRPr>
+            </a:lvl7pPr>
+            <a:lvl8pPr marL="3429000" indent="-228600" algn="l" defTabSz="457200" rtl="0" eaLnBrk="1" latinLnBrk="0" hangingPunct="1">
+              <a:spcBef>
+                <a:spcPts val="1000"/>
+              </a:spcBef>
+              <a:spcAft>
+                <a:spcPts val="0"/>
+              </a:spcAft>
+              <a:buClr>
+                <a:schemeClr val="accent1"/>
+              </a:buClr>
+              <a:buSzPct val="80000"/>
+              <a:buFont typeface="Wingdings 3" charset="2"/>
+              <a:buChar char=""/>
+              <a:defRPr sz="1200" b="0" i="0" kern="1200">
+                <a:solidFill>
+                  <a:schemeClr val="tx1">
+                    <a:lumMod val="75000"/>
+                    <a:lumOff val="25000"/>
+                  </a:schemeClr>
+                </a:solidFill>
+                <a:latin typeface="+mn-lt"/>
+                <a:ea typeface="+mn-ea"/>
+                <a:cs typeface="+mn-cs"/>
+              </a:defRPr>
+            </a:lvl8pPr>
+            <a:lvl9pPr marL="3886200" indent="-228600" algn="l" defTabSz="457200" rtl="0" eaLnBrk="1" latinLnBrk="0" hangingPunct="1">
+              <a:spcBef>
+                <a:spcPts val="1000"/>
+              </a:spcBef>
+              <a:spcAft>
+                <a:spcPts val="0"/>
+              </a:spcAft>
+              <a:buClr>
+                <a:schemeClr val="accent1"/>
+              </a:buClr>
+              <a:buSzPct val="80000"/>
+              <a:buFont typeface="Wingdings 3" charset="2"/>
+              <a:buChar char=""/>
+              <a:defRPr sz="1200" b="0" i="0" kern="1200">
+                <a:solidFill>
+                  <a:schemeClr val="tx1">
+                    <a:lumMod val="75000"/>
+                    <a:lumOff val="25000"/>
+                  </a:schemeClr>
+                </a:solidFill>
+                <a:latin typeface="+mn-lt"/>
+                <a:ea typeface="+mn-ea"/>
+                <a:cs typeface="+mn-cs"/>
+              </a:defRPr>
+            </a:lvl9pPr>
+          </a:lstStyle>
+          <a:p>
+            <a:endParaRPr lang="en-US" dirty="0"/>
+          </a:p>
+        </p:txBody>
+      </p:sp>
+    </p:spTree>
+    <p:extLst>
+      <p:ext uri="{BB962C8B-B14F-4D97-AF65-F5344CB8AC3E}">
+        <p14:creationId xmlns:p14="http://schemas.microsoft.com/office/powerpoint/2010/main" val="3604287986"/>
+      </p:ext>
+    </p:extLst>
+  </p:cSld>
+  <p:clrMapOvr>
+    <a:masterClrMapping/>
+  </p:clrMapOvr>
+  <p:timing>
+    <p:tnLst>
+      <p:par>
+        <p:cTn id="1" dur="indefinite" restart="never" nodeType="tmRoot"/>
+      </p:par>
+    </p:tnLst>
+  </p:timing>
+</p:sld>
+</file>
+
+<file path=ppt/slides/slide9.xml><?xml version="1.0" encoding="utf-8"?>
+<p:sld xmlns:a="http://schemas.openxmlformats.org/drawingml/2006/main" xmlns:r="http://schemas.openxmlformats.org/officeDocument/2006/relationships" xmlns:p="http://schemas.openxmlformats.org/presentationml/2006/main">
+  <p:cSld>
+    <p:spTree>
+      <p:nvGrpSpPr>
+        <p:cNvPr id="1" name=""/>
+        <p:cNvGrpSpPr/>
+        <p:nvPr/>
+      </p:nvGrpSpPr>
+      <p:grpSpPr>
+        <a:xfrm>
+          <a:off x="0" y="0"/>
+          <a:ext cx="0" cy="0"/>
+          <a:chOff x="0" y="0"/>
+          <a:chExt cx="0" cy="0"/>
+        </a:xfrm>
+      </p:grpSpPr>
+      <p:pic>
+        <p:nvPicPr>
+          <p:cNvPr id="4" name="Picture 3"/>
+          <p:cNvPicPr>
+            <a:picLocks noChangeAspect="1"/>
+          </p:cNvPicPr>
+          <p:nvPr/>
+        </p:nvPicPr>
+        <p:blipFill>
+          <a:blip r:embed="rId2">
+            <a:extLst>
+              <a:ext uri="{28A0092B-C50C-407E-A947-70E740481C1C}">
+                <a14:useLocalDpi xmlns:a14="http://schemas.microsoft.com/office/drawing/2010/main" val="0"/>
+              </a:ext>
+            </a:extLst>
+          </a:blip>
+          <a:stretch>
+            <a:fillRect/>
+          </a:stretch>
+        </p:blipFill>
+        <p:spPr>
+          <a:xfrm>
+            <a:off x="11093450" y="5759450"/>
+            <a:ext cx="1098550" cy="1098550"/>
+          </a:xfrm>
+          <a:prstGeom prst="rect">
+            <a:avLst/>
+          </a:prstGeom>
+        </p:spPr>
+      </p:pic>
+      <p:sp>
+        <p:nvSpPr>
+          <p:cNvPr id="5" name="Content Placeholder 8"/>
+          <p:cNvSpPr txBox="1">
+            <a:spLocks/>
+          </p:cNvSpPr>
+          <p:nvPr/>
+        </p:nvSpPr>
+        <p:spPr>
+          <a:xfrm>
+            <a:off x="979463" y="2364508"/>
+            <a:ext cx="8825659" cy="384175"/>
+          </a:xfrm>
+          <a:prstGeom prst="rect">
+            <a:avLst/>
+          </a:prstGeom>
+        </p:spPr>
+        <p:txBody>
+          <a:bodyPr vert="horz" lIns="91440" tIns="45720" rIns="91440" bIns="45720" rtlCol="0">
+            <a:normAutofit/>
+          </a:bodyPr>
+          <a:lstStyle>
+            <a:lvl1pPr marL="342900" indent="-342900" algn="l" defTabSz="457200" rtl="0" eaLnBrk="1" latinLnBrk="0" hangingPunct="1">
+              <a:spcBef>
+                <a:spcPts val="1000"/>
+              </a:spcBef>
+              <a:spcAft>
+                <a:spcPts val="0"/>
+              </a:spcAft>
+              <a:buClr>
+                <a:schemeClr val="accent1"/>
+              </a:buClr>
+              <a:buSzPct val="80000"/>
+              <a:buFont typeface="Wingdings 3" charset="2"/>
+              <a:buChar char=""/>
+              <a:defRPr sz="1800" b="0" i="0" kern="1200">
+                <a:solidFill>
+                  <a:schemeClr val="tx1">
+                    <a:lumMod val="75000"/>
+                    <a:lumOff val="25000"/>
+                  </a:schemeClr>
+                </a:solidFill>
+                <a:latin typeface="+mn-lt"/>
+                <a:ea typeface="+mn-ea"/>
+                <a:cs typeface="+mn-cs"/>
+              </a:defRPr>
+            </a:lvl1pPr>
+            <a:lvl2pPr marL="742950" indent="-285750" algn="l" defTabSz="457200" rtl="0" eaLnBrk="1" latinLnBrk="0" hangingPunct="1">
+              <a:spcBef>
+                <a:spcPts val="1000"/>
+              </a:spcBef>
+              <a:spcAft>
+                <a:spcPts val="0"/>
+              </a:spcAft>
+              <a:buClr>
+                <a:schemeClr val="accent1"/>
+              </a:buClr>
+              <a:buSzPct val="80000"/>
+              <a:buFont typeface="Wingdings 3" charset="2"/>
+              <a:buChar char=""/>
+              <a:defRPr sz="1600" b="0" i="0" kern="1200">
+                <a:solidFill>
+                  <a:schemeClr val="tx1">
+                    <a:lumMod val="75000"/>
+                    <a:lumOff val="25000"/>
+                  </a:schemeClr>
+                </a:solidFill>
+                <a:latin typeface="+mn-lt"/>
+                <a:ea typeface="+mn-ea"/>
+                <a:cs typeface="+mn-cs"/>
+              </a:defRPr>
+            </a:lvl2pPr>
+            <a:lvl3pPr marL="1143000" indent="-228600" algn="l" defTabSz="457200" rtl="0" eaLnBrk="1" latinLnBrk="0" hangingPunct="1">
+              <a:spcBef>
+                <a:spcPts val="1000"/>
+              </a:spcBef>
+              <a:spcAft>
+                <a:spcPts val="0"/>
+              </a:spcAft>
+              <a:buClr>
+                <a:schemeClr val="accent1"/>
+              </a:buClr>
+              <a:buSzPct val="80000"/>
+              <a:buFont typeface="Wingdings 3" charset="2"/>
+              <a:buChar char=""/>
+              <a:defRPr sz="1400" b="0" i="0" kern="1200">
+                <a:solidFill>
+                  <a:schemeClr val="tx1">
+                    <a:lumMod val="75000"/>
+                    <a:lumOff val="25000"/>
+                  </a:schemeClr>
+                </a:solidFill>
+                <a:latin typeface="+mn-lt"/>
+                <a:ea typeface="+mn-ea"/>
+                <a:cs typeface="+mn-cs"/>
+              </a:defRPr>
+            </a:lvl3pPr>
+            <a:lvl4pPr marL="1600200" indent="-228600" algn="l" defTabSz="457200" rtl="0" eaLnBrk="1" latinLnBrk="0" hangingPunct="1">
+              <a:spcBef>
+                <a:spcPts val="1000"/>
+              </a:spcBef>
+              <a:spcAft>
+                <a:spcPts val="0"/>
+              </a:spcAft>
+              <a:buClr>
+                <a:schemeClr val="accent1"/>
+              </a:buClr>
+              <a:buSzPct val="80000"/>
+              <a:buFont typeface="Wingdings 3" charset="2"/>
+              <a:buChar char=""/>
+              <a:defRPr sz="1200" b="0" i="0" kern="1200">
+                <a:solidFill>
+                  <a:schemeClr val="tx1">
+                    <a:lumMod val="75000"/>
+                    <a:lumOff val="25000"/>
+                  </a:schemeClr>
+                </a:solidFill>
+                <a:latin typeface="+mn-lt"/>
+                <a:ea typeface="+mn-ea"/>
+                <a:cs typeface="+mn-cs"/>
+              </a:defRPr>
+            </a:lvl4pPr>
+            <a:lvl5pPr marL="2057400" indent="-228600" algn="l" defTabSz="457200" rtl="0" eaLnBrk="1" latinLnBrk="0" hangingPunct="1">
+              <a:spcBef>
+                <a:spcPts val="1000"/>
+              </a:spcBef>
+              <a:spcAft>
+                <a:spcPts val="0"/>
+              </a:spcAft>
+              <a:buClr>
+                <a:schemeClr val="accent1"/>
+              </a:buClr>
+              <a:buSzPct val="80000"/>
+              <a:buFont typeface="Wingdings 3" charset="2"/>
+              <a:buChar char=""/>
+              <a:defRPr sz="1200" b="0" i="0" kern="1200">
+                <a:solidFill>
+                  <a:schemeClr val="tx1">
+                    <a:lumMod val="75000"/>
+                    <a:lumOff val="25000"/>
+                  </a:schemeClr>
+                </a:solidFill>
+                <a:latin typeface="+mn-lt"/>
+                <a:ea typeface="+mn-ea"/>
+                <a:cs typeface="+mn-cs"/>
+              </a:defRPr>
+            </a:lvl5pPr>
+            <a:lvl6pPr marL="2514600" indent="-228600" algn="l" defTabSz="457200" rtl="0" eaLnBrk="1" latinLnBrk="0" hangingPunct="1">
+              <a:spcBef>
+                <a:spcPts val="1000"/>
+              </a:spcBef>
+              <a:spcAft>
+                <a:spcPts val="0"/>
+              </a:spcAft>
+              <a:buClr>
+                <a:schemeClr val="accent1"/>
+              </a:buClr>
+              <a:buSzPct val="80000"/>
+              <a:buFont typeface="Wingdings 3" charset="2"/>
+              <a:buChar char=""/>
+              <a:defRPr sz="1200" b="0" i="0" kern="1200">
+                <a:solidFill>
+                  <a:schemeClr val="tx1">
+                    <a:lumMod val="75000"/>
+                    <a:lumOff val="25000"/>
+                  </a:schemeClr>
+                </a:solidFill>
+                <a:latin typeface="+mn-lt"/>
+                <a:ea typeface="+mn-ea"/>
+                <a:cs typeface="+mn-cs"/>
+              </a:defRPr>
+            </a:lvl6pPr>
+            <a:lvl7pPr marL="2971800" indent="-228600" algn="l" defTabSz="457200" rtl="0" eaLnBrk="1" latinLnBrk="0" hangingPunct="1">
+              <a:spcBef>
+                <a:spcPts val="1000"/>
+              </a:spcBef>
+              <a:spcAft>
+                <a:spcPts val="0"/>
+              </a:spcAft>
+              <a:buClr>
+                <a:schemeClr val="accent1"/>
+              </a:buClr>
+              <a:buSzPct val="80000"/>
+              <a:buFont typeface="Wingdings 3" charset="2"/>
+              <a:buChar char=""/>
+              <a:defRPr sz="1200" b="0" i="0" kern="1200">
+                <a:solidFill>
+                  <a:schemeClr val="tx1">
+                    <a:lumMod val="75000"/>
+                    <a:lumOff val="25000"/>
+                  </a:schemeClr>
+                </a:solidFill>
+                <a:latin typeface="+mn-lt"/>
+                <a:ea typeface="+mn-ea"/>
+                <a:cs typeface="+mn-cs"/>
+              </a:defRPr>
+            </a:lvl7pPr>
+            <a:lvl8pPr marL="3429000" indent="-228600" algn="l" defTabSz="457200" rtl="0" eaLnBrk="1" latinLnBrk="0" hangingPunct="1">
+              <a:spcBef>
+                <a:spcPts val="1000"/>
+              </a:spcBef>
+              <a:spcAft>
+                <a:spcPts val="0"/>
+              </a:spcAft>
+              <a:buClr>
+                <a:schemeClr val="accent1"/>
+              </a:buClr>
+              <a:buSzPct val="80000"/>
+              <a:buFont typeface="Wingdings 3" charset="2"/>
+              <a:buChar char=""/>
+              <a:defRPr sz="1200" b="0" i="0" kern="1200">
+                <a:solidFill>
+                  <a:schemeClr val="tx1">
+                    <a:lumMod val="75000"/>
+                    <a:lumOff val="25000"/>
+                  </a:schemeClr>
+                </a:solidFill>
+                <a:latin typeface="+mn-lt"/>
+                <a:ea typeface="+mn-ea"/>
+                <a:cs typeface="+mn-cs"/>
+              </a:defRPr>
+            </a:lvl8pPr>
+            <a:lvl9pPr marL="3886200" indent="-228600" algn="l" defTabSz="457200" rtl="0" eaLnBrk="1" latinLnBrk="0" hangingPunct="1">
+              <a:spcBef>
+                <a:spcPts val="1000"/>
+              </a:spcBef>
+              <a:spcAft>
+                <a:spcPts val="0"/>
+              </a:spcAft>
+              <a:buClr>
+                <a:schemeClr val="accent1"/>
+              </a:buClr>
+              <a:buSzPct val="80000"/>
+              <a:buFont typeface="Wingdings 3" charset="2"/>
+              <a:buChar char=""/>
+              <a:defRPr sz="1200" b="0" i="0" kern="1200">
+                <a:solidFill>
+                  <a:schemeClr val="tx1">
+                    <a:lumMod val="75000"/>
+                    <a:lumOff val="25000"/>
+                  </a:schemeClr>
+                </a:solidFill>
+                <a:latin typeface="+mn-lt"/>
+                <a:ea typeface="+mn-ea"/>
+                <a:cs typeface="+mn-cs"/>
+              </a:defRPr>
+            </a:lvl9pPr>
+          </a:lstStyle>
+          <a:p>
+            <a:endParaRPr lang="en-US" dirty="0"/>
+          </a:p>
+        </p:txBody>
+      </p:sp>
+      <p:pic>
+        <p:nvPicPr>
+          <p:cNvPr id="6" name="Picture 5"/>
+          <p:cNvPicPr>
+            <a:picLocks noChangeAspect="1"/>
+          </p:cNvPicPr>
+          <p:nvPr/>
+        </p:nvPicPr>
+        <p:blipFill>
+          <a:blip r:embed="rId3">
+            <a:extLst>
+              <a:ext uri="{28A0092B-C50C-407E-A947-70E740481C1C}">
+                <a14:useLocalDpi xmlns:a14="http://schemas.microsoft.com/office/drawing/2010/main" val="0"/>
+              </a:ext>
+            </a:extLst>
+          </a:blip>
+          <a:stretch>
+            <a:fillRect/>
+          </a:stretch>
+        </p:blipFill>
+        <p:spPr>
+          <a:xfrm>
+            <a:off x="600363" y="2670594"/>
+            <a:ext cx="5735781" cy="2852752"/>
+          </a:xfrm>
+          <a:prstGeom prst="rect">
+            <a:avLst/>
+          </a:prstGeom>
+        </p:spPr>
+      </p:pic>
+      <p:sp>
+        <p:nvSpPr>
+          <p:cNvPr id="8" name="Content Placeholder 7"/>
+          <p:cNvSpPr>
+            <a:spLocks noGrp="1"/>
+          </p:cNvSpPr>
+          <p:nvPr>
+            <p:ph idx="1"/>
+          </p:nvPr>
+        </p:nvSpPr>
+        <p:spPr>
+          <a:xfrm>
+            <a:off x="6627348" y="2953643"/>
+            <a:ext cx="4466102" cy="3187275"/>
+          </a:xfrm>
+        </p:spPr>
+        <p:txBody>
+          <a:bodyPr/>
+          <a:lstStyle/>
+          <a:p>
+            <a:r>
+              <a:rPr lang="en-US" dirty="0" smtClean="0"/>
+              <a:t>African version of </a:t>
+            </a:r>
+            <a:r>
+              <a:rPr lang="en-US" dirty="0" err="1" smtClean="0"/>
+              <a:t>erum</a:t>
+            </a:r>
+            <a:endParaRPr lang="en-US" dirty="0" smtClean="0"/>
+          </a:p>
+          <a:p>
+            <a:r>
+              <a:rPr lang="en-US" dirty="0" smtClean="0"/>
+              <a:t>3 days summer school, 2 days workshop</a:t>
+            </a:r>
+          </a:p>
+          <a:p>
+            <a:r>
+              <a:rPr lang="en-US" dirty="0" err="1" smtClean="0"/>
+              <a:t>Venueshould</a:t>
+            </a:r>
+            <a:r>
+              <a:rPr lang="en-US" dirty="0" smtClean="0"/>
+              <a:t> be a country with </a:t>
+            </a:r>
+            <a:r>
+              <a:rPr lang="en-US" dirty="0" err="1" smtClean="0"/>
+              <a:t>linient</a:t>
+            </a:r>
+            <a:r>
+              <a:rPr lang="en-US" dirty="0" smtClean="0"/>
+              <a:t> travel rules (visas and passports)</a:t>
+            </a:r>
+            <a:endParaRPr lang="en-US" dirty="0"/>
+          </a:p>
+        </p:txBody>
+      </p:sp>
+      <p:sp>
+        <p:nvSpPr>
+          <p:cNvPr id="10" name="Title 9"/>
+          <p:cNvSpPr>
+            <a:spLocks noGrp="1"/>
+          </p:cNvSpPr>
+          <p:nvPr>
+            <p:ph type="title"/>
+          </p:nvPr>
+        </p:nvSpPr>
+        <p:spPr>
+          <a:xfrm>
+            <a:off x="507999" y="452583"/>
+            <a:ext cx="11203709" cy="1376217"/>
+          </a:xfrm>
+        </p:spPr>
+        <p:txBody>
+          <a:bodyPr/>
+          <a:lstStyle/>
+          <a:p>
+            <a:r>
+              <a:rPr lang="en-US" dirty="0" smtClean="0"/>
+              <a:t/>
+            </a:r>
+            <a:br>
+              <a:rPr lang="en-US" dirty="0" smtClean="0"/>
+            </a:br>
+            <a:r>
+              <a:rPr lang="en-US" dirty="0" smtClean="0"/>
+              <a:t/>
+            </a:r>
+            <a:br>
+              <a:rPr lang="en-US" dirty="0" smtClean="0"/>
+            </a:br>
+            <a:r>
+              <a:rPr lang="en-US" dirty="0" smtClean="0"/>
+              <a:t>04: </a:t>
+            </a:r>
+            <a:r>
+              <a:rPr lang="en-US" b="1" i="1" dirty="0"/>
+              <a:t>Have a grand </a:t>
+            </a:r>
+            <a:r>
+              <a:rPr lang="en-US" b="1" i="1" dirty="0" err="1"/>
+              <a:t>AfricaR</a:t>
+            </a:r>
+            <a:r>
+              <a:rPr lang="en-US" b="1" i="1" dirty="0"/>
+              <a:t> Conference </a:t>
+            </a:r>
+            <a:br>
+              <a:rPr lang="en-US" b="1" i="1" dirty="0"/>
+            </a:br>
+            <a:r>
+              <a:rPr lang="en-US" dirty="0"/>
+              <a:t/>
+            </a:r>
+            <a:br>
+              <a:rPr lang="en-US" dirty="0"/>
+            </a:br>
+            <a:r>
+              <a:rPr lang="en-US" b="1" i="1" dirty="0"/>
+              <a:t/>
+            </a:r>
+            <a:br>
+              <a:rPr lang="en-US" b="1" i="1" dirty="0"/>
+            </a:br>
+            <a:endParaRPr lang="en-US" dirty="0"/>
+          </a:p>
+        </p:txBody>
+      </p:sp>
+    </p:spTree>
+    <p:extLst>
+      <p:ext uri="{BB962C8B-B14F-4D97-AF65-F5344CB8AC3E}">
+        <p14:creationId xmlns:p14="http://schemas.microsoft.com/office/powerpoint/2010/main" val="3030583601"/>
       </p:ext>
     </p:extLst>
   </p:cSld>

</xml_diff>